<commit_message>
second draft of Slurm materials
</commit_message>
<xml_diff>
--- a/Day1/Slurm-Parallel.pptx
+++ b/Day1/Slurm-Parallel.pptx
@@ -7,7 +7,7 @@
     <p:sldMasterId id="2147483684" r:id="rId3"/>
   </p:sldMasterIdLst>
   <p:notesMasterIdLst>
-    <p:notesMasterId r:id="rId27"/>
+    <p:notesMasterId r:id="rId32"/>
   </p:notesMasterIdLst>
   <p:sldIdLst>
     <p:sldId id="265" r:id="rId4"/>
@@ -31,8 +31,13 @@
     <p:sldId id="315" r:id="rId22"/>
     <p:sldId id="316" r:id="rId23"/>
     <p:sldId id="318" r:id="rId24"/>
-    <p:sldId id="311" r:id="rId25"/>
-    <p:sldId id="317" r:id="rId26"/>
+    <p:sldId id="323" r:id="rId25"/>
+    <p:sldId id="311" r:id="rId26"/>
+    <p:sldId id="321" r:id="rId27"/>
+    <p:sldId id="320" r:id="rId28"/>
+    <p:sldId id="322" r:id="rId29"/>
+    <p:sldId id="319" r:id="rId30"/>
+    <p:sldId id="317" r:id="rId31"/>
   </p:sldIdLst>
   <p:sldSz cx="9144000" cy="6858000" type="screen4x3"/>
   <p:notesSz cx="6858000" cy="9144000"/>
@@ -1870,7 +1875,7 @@
           <a:lstStyle/>
           <a:p>
             <a:r>
-              <a:rPr lang="en-US" smtClean="0">
+              <a:rPr lang="en-US" dirty="0" smtClean="0">
                 <a:latin typeface="Calibri"/>
               </a:rPr>
               <a:t>Then ask for 2 nodes with 24 cores each.</a:t>
@@ -1961,29 +1966,6 @@
           <a:bodyPr/>
           <a:lstStyle/>
           <a:p>
-            <a:r>
-              <a:rPr lang="en-US" dirty="0">
-                <a:latin typeface="Calibri"/>
-              </a:rPr>
-              <a:t>Jump in with questions any time ... hope to </a:t>
-            </a:r>
-            <a:r>
-              <a:rPr lang="en-US" dirty="0" smtClean="0">
-                <a:latin typeface="Calibri"/>
-              </a:rPr>
-              <a:t>leave </a:t>
-            </a:r>
-            <a:r>
-              <a:rPr lang="en-US" dirty="0">
-                <a:latin typeface="Calibri"/>
-              </a:rPr>
-              <a:t>time for discussion at the end.</a:t>
-            </a:r>
-            <a:br>
-              <a:rPr lang="en-US" dirty="0">
-                <a:latin typeface="Calibri"/>
-              </a:rPr>
-            </a:br>
             <a:endParaRPr lang="en-US" dirty="0">
               <a:latin typeface="Calibri"/>
             </a:endParaRPr>
@@ -2016,7 +1998,7 @@
     </p:spTree>
     <p:extLst>
       <p:ext uri="{BB962C8B-B14F-4D97-AF65-F5344CB8AC3E}">
-        <p14:creationId xmlns:p14="http://schemas.microsoft.com/office/powerpoint/2010/main" val="234120436"/>
+        <p14:creationId xmlns:p14="http://schemas.microsoft.com/office/powerpoint/2010/main" val="282346119"/>
       </p:ext>
     </p:extLst>
   </p:cSld>
@@ -2070,6 +2052,504 @@
           <a:bodyPr/>
           <a:lstStyle/>
           <a:p>
+            <a:endParaRPr lang="en-US" dirty="0">
+              <a:latin typeface="Calibri"/>
+            </a:endParaRPr>
+          </a:p>
+        </p:txBody>
+      </p:sp>
+      <p:sp>
+        <p:nvSpPr>
+          <p:cNvPr id="4" name="Slide Number Placeholder 3"/>
+          <p:cNvSpPr>
+            <a:spLocks noGrp="1"/>
+          </p:cNvSpPr>
+          <p:nvPr>
+            <p:ph type="sldNum" sz="quarter" idx="10"/>
+          </p:nvPr>
+        </p:nvSpPr>
+        <p:spPr/>
+        <p:txBody>
+          <a:bodyPr/>
+          <a:lstStyle/>
+          <a:p>
+            <a:fld id="{070FA3C9-EB82-4E06-AE86-51EE14A14F9A}" type="slidenum">
+              <a:rPr lang="en-US"/>
+              <a:t>23</a:t>
+            </a:fld>
+            <a:endParaRPr lang="en-US"/>
+          </a:p>
+        </p:txBody>
+      </p:sp>
+    </p:spTree>
+    <p:extLst>
+      <p:ext uri="{BB962C8B-B14F-4D97-AF65-F5344CB8AC3E}">
+        <p14:creationId xmlns:p14="http://schemas.microsoft.com/office/powerpoint/2010/main" val="234120436"/>
+      </p:ext>
+    </p:extLst>
+  </p:cSld>
+  <p:clrMapOvr>
+    <a:masterClrMapping/>
+  </p:clrMapOvr>
+</p:notes>
+</file>
+
+<file path=ppt/notesSlides/notesSlide24.xml><?xml version="1.0" encoding="utf-8"?>
+<p:notes xmlns:a="http://schemas.openxmlformats.org/drawingml/2006/main" xmlns:r="http://schemas.openxmlformats.org/officeDocument/2006/relationships" xmlns:p="http://schemas.openxmlformats.org/presentationml/2006/main">
+  <p:cSld>
+    <p:spTree>
+      <p:nvGrpSpPr>
+        <p:cNvPr id="1" name=""/>
+        <p:cNvGrpSpPr/>
+        <p:nvPr/>
+      </p:nvGrpSpPr>
+      <p:grpSpPr>
+        <a:xfrm>
+          <a:off x="0" y="0"/>
+          <a:ext cx="0" cy="0"/>
+          <a:chOff x="0" y="0"/>
+          <a:chExt cx="0" cy="0"/>
+        </a:xfrm>
+      </p:grpSpPr>
+      <p:sp>
+        <p:nvSpPr>
+          <p:cNvPr id="2" name="Slide Image Placeholder 1"/>
+          <p:cNvSpPr>
+            <a:spLocks noGrp="1" noRot="1" noChangeAspect="1"/>
+          </p:cNvSpPr>
+          <p:nvPr>
+            <p:ph type="sldImg"/>
+          </p:nvPr>
+        </p:nvSpPr>
+        <p:spPr/>
+      </p:sp>
+      <p:sp>
+        <p:nvSpPr>
+          <p:cNvPr id="3" name="Notes Placeholder 2"/>
+          <p:cNvSpPr>
+            <a:spLocks noGrp="1"/>
+          </p:cNvSpPr>
+          <p:nvPr>
+            <p:ph type="body" idx="1"/>
+          </p:nvPr>
+        </p:nvSpPr>
+        <p:spPr/>
+        <p:txBody>
+          <a:bodyPr/>
+          <a:lstStyle/>
+          <a:p>
+            <a:r>
+              <a:rPr lang="en-US" dirty="0" smtClean="0">
+                <a:latin typeface="Calibri"/>
+              </a:rPr>
+              <a:t>Resource</a:t>
+            </a:r>
+            <a:r>
+              <a:rPr lang="en-US" baseline="0" dirty="0" smtClean="0">
+                <a:latin typeface="Calibri"/>
+              </a:rPr>
+              <a:t> requests are per array task</a:t>
+            </a:r>
+            <a:endParaRPr lang="en-US" dirty="0">
+              <a:latin typeface="Calibri"/>
+            </a:endParaRPr>
+          </a:p>
+        </p:txBody>
+      </p:sp>
+      <p:sp>
+        <p:nvSpPr>
+          <p:cNvPr id="4" name="Slide Number Placeholder 3"/>
+          <p:cNvSpPr>
+            <a:spLocks noGrp="1"/>
+          </p:cNvSpPr>
+          <p:nvPr>
+            <p:ph type="sldNum" sz="quarter" idx="10"/>
+          </p:nvPr>
+        </p:nvSpPr>
+        <p:spPr/>
+        <p:txBody>
+          <a:bodyPr/>
+          <a:lstStyle/>
+          <a:p>
+            <a:fld id="{070FA3C9-EB82-4E06-AE86-51EE14A14F9A}" type="slidenum">
+              <a:rPr lang="en-US"/>
+              <a:t>24</a:t>
+            </a:fld>
+            <a:endParaRPr lang="en-US"/>
+          </a:p>
+        </p:txBody>
+      </p:sp>
+    </p:spTree>
+    <p:extLst>
+      <p:ext uri="{BB962C8B-B14F-4D97-AF65-F5344CB8AC3E}">
+        <p14:creationId xmlns:p14="http://schemas.microsoft.com/office/powerpoint/2010/main" val="616159243"/>
+      </p:ext>
+    </p:extLst>
+  </p:cSld>
+  <p:clrMapOvr>
+    <a:masterClrMapping/>
+  </p:clrMapOvr>
+</p:notes>
+</file>
+
+<file path=ppt/notesSlides/notesSlide25.xml><?xml version="1.0" encoding="utf-8"?>
+<p:notes xmlns:a="http://schemas.openxmlformats.org/drawingml/2006/main" xmlns:r="http://schemas.openxmlformats.org/officeDocument/2006/relationships" xmlns:p="http://schemas.openxmlformats.org/presentationml/2006/main">
+  <p:cSld>
+    <p:spTree>
+      <p:nvGrpSpPr>
+        <p:cNvPr id="1" name=""/>
+        <p:cNvGrpSpPr/>
+        <p:nvPr/>
+      </p:nvGrpSpPr>
+      <p:grpSpPr>
+        <a:xfrm>
+          <a:off x="0" y="0"/>
+          <a:ext cx="0" cy="0"/>
+          <a:chOff x="0" y="0"/>
+          <a:chExt cx="0" cy="0"/>
+        </a:xfrm>
+      </p:grpSpPr>
+      <p:sp>
+        <p:nvSpPr>
+          <p:cNvPr id="2" name="Slide Image Placeholder 1"/>
+          <p:cNvSpPr>
+            <a:spLocks noGrp="1" noRot="1" noChangeAspect="1"/>
+          </p:cNvSpPr>
+          <p:nvPr>
+            <p:ph type="sldImg"/>
+          </p:nvPr>
+        </p:nvSpPr>
+        <p:spPr/>
+      </p:sp>
+      <p:sp>
+        <p:nvSpPr>
+          <p:cNvPr id="3" name="Notes Placeholder 2"/>
+          <p:cNvSpPr>
+            <a:spLocks noGrp="1"/>
+          </p:cNvSpPr>
+          <p:nvPr>
+            <p:ph type="body" idx="1"/>
+          </p:nvPr>
+        </p:nvSpPr>
+        <p:spPr/>
+        <p:txBody>
+          <a:bodyPr/>
+          <a:lstStyle/>
+          <a:p>
+            <a:r>
+              <a:rPr lang="en-US" dirty="0" smtClean="0">
+                <a:latin typeface="Calibri"/>
+              </a:rPr>
+              <a:t>Explain [] syntax</a:t>
+            </a:r>
+            <a:endParaRPr lang="en-US" dirty="0">
+              <a:latin typeface="Calibri"/>
+            </a:endParaRPr>
+          </a:p>
+        </p:txBody>
+      </p:sp>
+      <p:sp>
+        <p:nvSpPr>
+          <p:cNvPr id="4" name="Slide Number Placeholder 3"/>
+          <p:cNvSpPr>
+            <a:spLocks noGrp="1"/>
+          </p:cNvSpPr>
+          <p:nvPr>
+            <p:ph type="sldNum" sz="quarter" idx="10"/>
+          </p:nvPr>
+        </p:nvSpPr>
+        <p:spPr/>
+        <p:txBody>
+          <a:bodyPr/>
+          <a:lstStyle/>
+          <a:p>
+            <a:fld id="{070FA3C9-EB82-4E06-AE86-51EE14A14F9A}" type="slidenum">
+              <a:rPr lang="en-US"/>
+              <a:t>25</a:t>
+            </a:fld>
+            <a:endParaRPr lang="en-US"/>
+          </a:p>
+        </p:txBody>
+      </p:sp>
+    </p:spTree>
+    <p:extLst>
+      <p:ext uri="{BB962C8B-B14F-4D97-AF65-F5344CB8AC3E}">
+        <p14:creationId xmlns:p14="http://schemas.microsoft.com/office/powerpoint/2010/main" val="1922421748"/>
+      </p:ext>
+    </p:extLst>
+  </p:cSld>
+  <p:clrMapOvr>
+    <a:masterClrMapping/>
+  </p:clrMapOvr>
+</p:notes>
+</file>
+
+<file path=ppt/notesSlides/notesSlide26.xml><?xml version="1.0" encoding="utf-8"?>
+<p:notes xmlns:a="http://schemas.openxmlformats.org/drawingml/2006/main" xmlns:r="http://schemas.openxmlformats.org/officeDocument/2006/relationships" xmlns:p="http://schemas.openxmlformats.org/presentationml/2006/main">
+  <p:cSld>
+    <p:spTree>
+      <p:nvGrpSpPr>
+        <p:cNvPr id="1" name=""/>
+        <p:cNvGrpSpPr/>
+        <p:nvPr/>
+      </p:nvGrpSpPr>
+      <p:grpSpPr>
+        <a:xfrm>
+          <a:off x="0" y="0"/>
+          <a:ext cx="0" cy="0"/>
+          <a:chOff x="0" y="0"/>
+          <a:chExt cx="0" cy="0"/>
+        </a:xfrm>
+      </p:grpSpPr>
+      <p:sp>
+        <p:nvSpPr>
+          <p:cNvPr id="2" name="Slide Image Placeholder 1"/>
+          <p:cNvSpPr>
+            <a:spLocks noGrp="1" noRot="1" noChangeAspect="1"/>
+          </p:cNvSpPr>
+          <p:nvPr>
+            <p:ph type="sldImg"/>
+          </p:nvPr>
+        </p:nvSpPr>
+        <p:spPr/>
+      </p:sp>
+      <p:sp>
+        <p:nvSpPr>
+          <p:cNvPr id="3" name="Notes Placeholder 2"/>
+          <p:cNvSpPr>
+            <a:spLocks noGrp="1"/>
+          </p:cNvSpPr>
+          <p:nvPr>
+            <p:ph type="body" idx="1"/>
+          </p:nvPr>
+        </p:nvSpPr>
+        <p:spPr/>
+        <p:txBody>
+          <a:bodyPr/>
+          <a:lstStyle/>
+          <a:p>
+            <a:r>
+              <a:rPr lang="en-US" dirty="0" smtClean="0">
+                <a:latin typeface="Calibri"/>
+              </a:rPr>
+              <a:t>Block the reservation</a:t>
+            </a:r>
+            <a:r>
+              <a:rPr lang="en-US" baseline="0" dirty="0" smtClean="0">
+                <a:latin typeface="Calibri"/>
+              </a:rPr>
+              <a:t> before letting them do the example</a:t>
+            </a:r>
+          </a:p>
+          <a:p>
+            <a:r>
+              <a:rPr lang="en-US" baseline="0" dirty="0" smtClean="0">
+                <a:latin typeface="Calibri"/>
+              </a:rPr>
+              <a:t>Use </a:t>
+            </a:r>
+            <a:r>
+              <a:rPr lang="en-US" baseline="0" dirty="0" err="1" smtClean="0">
+                <a:latin typeface="Calibri"/>
+              </a:rPr>
+              <a:t>squeue</a:t>
+            </a:r>
+            <a:r>
+              <a:rPr lang="en-US" baseline="0" dirty="0" smtClean="0">
+                <a:latin typeface="Calibri"/>
+              </a:rPr>
+              <a:t> to watch the progress of the jobs</a:t>
+            </a:r>
+            <a:endParaRPr lang="en-US" dirty="0">
+              <a:latin typeface="Calibri"/>
+            </a:endParaRPr>
+          </a:p>
+        </p:txBody>
+      </p:sp>
+      <p:sp>
+        <p:nvSpPr>
+          <p:cNvPr id="4" name="Slide Number Placeholder 3"/>
+          <p:cNvSpPr>
+            <a:spLocks noGrp="1"/>
+          </p:cNvSpPr>
+          <p:nvPr>
+            <p:ph type="sldNum" sz="quarter" idx="10"/>
+          </p:nvPr>
+        </p:nvSpPr>
+        <p:spPr/>
+        <p:txBody>
+          <a:bodyPr/>
+          <a:lstStyle/>
+          <a:p>
+            <a:fld id="{070FA3C9-EB82-4E06-AE86-51EE14A14F9A}" type="slidenum">
+              <a:rPr lang="en-US"/>
+              <a:t>26</a:t>
+            </a:fld>
+            <a:endParaRPr lang="en-US"/>
+          </a:p>
+        </p:txBody>
+      </p:sp>
+    </p:spTree>
+    <p:extLst>
+      <p:ext uri="{BB962C8B-B14F-4D97-AF65-F5344CB8AC3E}">
+        <p14:creationId xmlns:p14="http://schemas.microsoft.com/office/powerpoint/2010/main" val="1425862211"/>
+      </p:ext>
+    </p:extLst>
+  </p:cSld>
+  <p:clrMapOvr>
+    <a:masterClrMapping/>
+  </p:clrMapOvr>
+</p:notes>
+</file>
+
+<file path=ppt/notesSlides/notesSlide27.xml><?xml version="1.0" encoding="utf-8"?>
+<p:notes xmlns:a="http://schemas.openxmlformats.org/drawingml/2006/main" xmlns:r="http://schemas.openxmlformats.org/officeDocument/2006/relationships" xmlns:p="http://schemas.openxmlformats.org/presentationml/2006/main">
+  <p:cSld>
+    <p:spTree>
+      <p:nvGrpSpPr>
+        <p:cNvPr id="1" name=""/>
+        <p:cNvGrpSpPr/>
+        <p:nvPr/>
+      </p:nvGrpSpPr>
+      <p:grpSpPr>
+        <a:xfrm>
+          <a:off x="0" y="0"/>
+          <a:ext cx="0" cy="0"/>
+          <a:chOff x="0" y="0"/>
+          <a:chExt cx="0" cy="0"/>
+        </a:xfrm>
+      </p:grpSpPr>
+      <p:sp>
+        <p:nvSpPr>
+          <p:cNvPr id="2" name="Slide Image Placeholder 1"/>
+          <p:cNvSpPr>
+            <a:spLocks noGrp="1" noRot="1" noChangeAspect="1"/>
+          </p:cNvSpPr>
+          <p:nvPr>
+            <p:ph type="sldImg"/>
+          </p:nvPr>
+        </p:nvSpPr>
+        <p:spPr/>
+      </p:sp>
+      <p:sp>
+        <p:nvSpPr>
+          <p:cNvPr id="3" name="Notes Placeholder 2"/>
+          <p:cNvSpPr>
+            <a:spLocks noGrp="1"/>
+          </p:cNvSpPr>
+          <p:nvPr>
+            <p:ph type="body" idx="1"/>
+          </p:nvPr>
+        </p:nvSpPr>
+        <p:spPr/>
+        <p:txBody>
+          <a:bodyPr/>
+          <a:lstStyle/>
+          <a:p>
+            <a:r>
+              <a:rPr lang="en-US" dirty="0" smtClean="0">
+                <a:latin typeface="Calibri"/>
+              </a:rPr>
+              <a:t>Use </a:t>
+            </a:r>
+            <a:r>
+              <a:rPr lang="en-US" dirty="0" err="1" smtClean="0">
+                <a:latin typeface="Calibri"/>
+              </a:rPr>
+              <a:t>squeue</a:t>
+            </a:r>
+            <a:r>
+              <a:rPr lang="en-US" dirty="0" smtClean="0">
+                <a:latin typeface="Calibri"/>
+              </a:rPr>
+              <a:t> to watch the progress of your jobs</a:t>
+            </a:r>
+            <a:endParaRPr lang="en-US" dirty="0">
+              <a:latin typeface="Calibri"/>
+            </a:endParaRPr>
+          </a:p>
+        </p:txBody>
+      </p:sp>
+      <p:sp>
+        <p:nvSpPr>
+          <p:cNvPr id="4" name="Slide Number Placeholder 3"/>
+          <p:cNvSpPr>
+            <a:spLocks noGrp="1"/>
+          </p:cNvSpPr>
+          <p:nvPr>
+            <p:ph type="sldNum" sz="quarter" idx="10"/>
+          </p:nvPr>
+        </p:nvSpPr>
+        <p:spPr/>
+        <p:txBody>
+          <a:bodyPr/>
+          <a:lstStyle/>
+          <a:p>
+            <a:fld id="{070FA3C9-EB82-4E06-AE86-51EE14A14F9A}" type="slidenum">
+              <a:rPr lang="en-US"/>
+              <a:t>27</a:t>
+            </a:fld>
+            <a:endParaRPr lang="en-US"/>
+          </a:p>
+        </p:txBody>
+      </p:sp>
+    </p:spTree>
+    <p:extLst>
+      <p:ext uri="{BB962C8B-B14F-4D97-AF65-F5344CB8AC3E}">
+        <p14:creationId xmlns:p14="http://schemas.microsoft.com/office/powerpoint/2010/main" val="1681144393"/>
+      </p:ext>
+    </p:extLst>
+  </p:cSld>
+  <p:clrMapOvr>
+    <a:masterClrMapping/>
+  </p:clrMapOvr>
+</p:notes>
+</file>
+
+<file path=ppt/notesSlides/notesSlide28.xml><?xml version="1.0" encoding="utf-8"?>
+<p:notes xmlns:a="http://schemas.openxmlformats.org/drawingml/2006/main" xmlns:r="http://schemas.openxmlformats.org/officeDocument/2006/relationships" xmlns:p="http://schemas.openxmlformats.org/presentationml/2006/main">
+  <p:cSld>
+    <p:spTree>
+      <p:nvGrpSpPr>
+        <p:cNvPr id="1" name=""/>
+        <p:cNvGrpSpPr/>
+        <p:nvPr/>
+      </p:nvGrpSpPr>
+      <p:grpSpPr>
+        <a:xfrm>
+          <a:off x="0" y="0"/>
+          <a:ext cx="0" cy="0"/>
+          <a:chOff x="0" y="0"/>
+          <a:chExt cx="0" cy="0"/>
+        </a:xfrm>
+      </p:grpSpPr>
+      <p:sp>
+        <p:nvSpPr>
+          <p:cNvPr id="2" name="Slide Image Placeholder 1"/>
+          <p:cNvSpPr>
+            <a:spLocks noGrp="1" noRot="1" noChangeAspect="1"/>
+          </p:cNvSpPr>
+          <p:nvPr>
+            <p:ph type="sldImg"/>
+          </p:nvPr>
+        </p:nvSpPr>
+        <p:spPr/>
+      </p:sp>
+      <p:sp>
+        <p:nvSpPr>
+          <p:cNvPr id="3" name="Notes Placeholder 2"/>
+          <p:cNvSpPr>
+            <a:spLocks noGrp="1"/>
+          </p:cNvSpPr>
+          <p:nvPr>
+            <p:ph type="body" idx="1"/>
+          </p:nvPr>
+        </p:nvSpPr>
+        <p:spPr/>
+        <p:txBody>
+          <a:bodyPr/>
+          <a:lstStyle/>
+          <a:p>
             <a:endParaRPr lang="en-US" dirty="0"/>
           </a:p>
         </p:txBody>
@@ -2091,7 +2571,7 @@
           <a:p>
             <a:fld id="{02804E8B-6BB9-094C-A88F-D874D2139504}" type="slidenum">
               <a:rPr lang="en-US" smtClean="0"/>
-              <a:t>23</a:t>
+              <a:t>28</a:t>
             </a:fld>
             <a:endParaRPr lang="en-US"/>
           </a:p>
@@ -21003,8 +21483,27 @@
           <a:p>
             <a:r>
               <a:rPr lang="en-US" dirty="0"/>
-              <a:t>Specify the “parallelD1” reservation</a:t>
-            </a:r>
+              <a:t>Specify the “parallelD1” </a:t>
+            </a:r>
+            <a:r>
+              <a:rPr lang="en-US" dirty="0" smtClean="0"/>
+              <a:t>reservation</a:t>
+            </a:r>
+          </a:p>
+          <a:p>
+            <a:r>
+              <a:rPr lang="en-US" dirty="0" smtClean="0"/>
+              <a:t>Also need to load “</a:t>
+            </a:r>
+            <a:r>
+              <a:rPr lang="en-US" dirty="0" err="1" smtClean="0"/>
+              <a:t>impi</a:t>
+            </a:r>
+            <a:r>
+              <a:rPr lang="en-US" dirty="0" smtClean="0"/>
+              <a:t>” module</a:t>
+            </a:r>
+            <a:endParaRPr lang="en-US" dirty="0"/>
           </a:p>
           <a:p>
             <a:r>
@@ -21180,7 +21679,7 @@
                   <a:schemeClr val="tx2"/>
                 </a:solidFill>
               </a:rPr>
-              <a:t>Job arrays</a:t>
+              <a:t>Exercise 4 - answer</a:t>
             </a:r>
             <a:endParaRPr lang="en-US" dirty="0">
               <a:solidFill>
@@ -21207,88 +21706,621 @@
           </a:bodyPr>
           <a:lstStyle/>
           <a:p>
-            <a:r>
-              <a:rPr lang="en-US" dirty="0" smtClean="0"/>
-              <a:t>A collection of batch jobs with identical resource requirements</a:t>
-            </a:r>
-            <a:endParaRPr lang="en-US" dirty="0"/>
-          </a:p>
-          <a:p>
-            <a:r>
-              <a:rPr lang="en-US" dirty="0" smtClean="0"/>
-              <a:t>Why is job scheduling needed?</a:t>
-            </a:r>
-          </a:p>
-          <a:p>
-            <a:r>
-              <a:rPr lang="en-US" dirty="0" smtClean="0"/>
-              <a:t>Overview of </a:t>
-            </a:r>
-            <a:r>
-              <a:rPr lang="en-US" dirty="0" err="1" smtClean="0"/>
+            <a:pPr marL="114300" indent="0">
+              <a:buNone/>
+            </a:pPr>
+            <a:r>
+              <a:rPr lang="en-US" sz="1400" dirty="0">
+                <a:latin typeface="Courier" charset="0"/>
+                <a:ea typeface="Courier" charset="0"/>
+                <a:cs typeface="Courier" charset="0"/>
+              </a:rPr>
+              <a:t>#!/</a:t>
+            </a:r>
+            <a:r>
+              <a:rPr lang="en-US" sz="1400" dirty="0" smtClean="0">
+                <a:latin typeface="Courier" charset="0"/>
+                <a:ea typeface="Courier" charset="0"/>
+                <a:cs typeface="Courier" charset="0"/>
+              </a:rPr>
+              <a:t>bin/bash</a:t>
+            </a:r>
+          </a:p>
+          <a:p>
+            <a:pPr marL="114300" indent="0">
+              <a:buNone/>
+            </a:pPr>
+            <a:r>
+              <a:rPr lang="en-US" sz="1400" dirty="0">
+                <a:latin typeface="Courier" charset="0"/>
+                <a:ea typeface="Courier" charset="0"/>
+                <a:cs typeface="Courier" charset="0"/>
+              </a:rPr>
+              <a:t>#SBATCH --</a:t>
+            </a:r>
+            <a:r>
+              <a:rPr lang="en-US" sz="1400" dirty="0" smtClean="0">
+                <a:latin typeface="Courier" charset="0"/>
+                <a:ea typeface="Courier" charset="0"/>
+                <a:cs typeface="Courier" charset="0"/>
+              </a:rPr>
+              <a:t>nodes=1</a:t>
+            </a:r>
+            <a:r>
+              <a:rPr lang="en-US" sz="1400" dirty="0">
+                <a:latin typeface="Courier" charset="0"/>
+                <a:ea typeface="Courier" charset="0"/>
+                <a:cs typeface="Courier" charset="0"/>
+              </a:rPr>
+              <a:t>            </a:t>
+            </a:r>
+            <a:r>
+              <a:rPr lang="en-US" sz="1400" dirty="0" smtClean="0">
+                <a:latin typeface="Courier" charset="0"/>
+                <a:ea typeface="Courier" charset="0"/>
+                <a:cs typeface="Courier" charset="0"/>
+              </a:rPr>
+              <a:t># </a:t>
+            </a:r>
+            <a:r>
+              <a:rPr lang="en-US" sz="1400" dirty="0">
+                <a:latin typeface="Courier" charset="0"/>
+                <a:ea typeface="Courier" charset="0"/>
+                <a:cs typeface="Courier" charset="0"/>
+              </a:rPr>
+              <a:t>Number of requested </a:t>
+            </a:r>
+            <a:r>
+              <a:rPr lang="en-US" sz="1400" dirty="0" smtClean="0">
+                <a:latin typeface="Courier" charset="0"/>
+                <a:ea typeface="Courier" charset="0"/>
+                <a:cs typeface="Courier" charset="0"/>
+              </a:rPr>
+              <a:t>nodes</a:t>
+            </a:r>
+          </a:p>
+          <a:p>
+            <a:pPr marL="114300" indent="0">
+              <a:buNone/>
+            </a:pPr>
+            <a:r>
+              <a:rPr lang="en-US" sz="1400" dirty="0">
+                <a:latin typeface="Courier" charset="0"/>
+                <a:ea typeface="Courier" charset="0"/>
+                <a:cs typeface="Courier" charset="0"/>
+              </a:rPr>
+              <a:t>#SBATCH --</a:t>
+            </a:r>
+            <a:r>
+              <a:rPr lang="en-US" sz="1400" dirty="0" err="1" smtClean="0">
+                <a:latin typeface="Courier" charset="0"/>
+                <a:ea typeface="Courier" charset="0"/>
+                <a:cs typeface="Courier" charset="0"/>
+              </a:rPr>
+              <a:t>ntasks</a:t>
+            </a:r>
+            <a:r>
+              <a:rPr lang="en-US" sz="1400" dirty="0" smtClean="0">
+                <a:latin typeface="Courier" charset="0"/>
+                <a:ea typeface="Courier" charset="0"/>
+                <a:cs typeface="Courier" charset="0"/>
+              </a:rPr>
+              <a:t>=24  </a:t>
+            </a:r>
+            <a:r>
+              <a:rPr lang="en-US" sz="1400" dirty="0">
+                <a:latin typeface="Courier" charset="0"/>
+                <a:ea typeface="Courier" charset="0"/>
+                <a:cs typeface="Courier" charset="0"/>
+              </a:rPr>
+              <a:t>   </a:t>
+            </a:r>
+            <a:r>
+              <a:rPr lang="en-US" sz="1400" dirty="0" smtClean="0">
+                <a:latin typeface="Courier" charset="0"/>
+                <a:ea typeface="Courier" charset="0"/>
+                <a:cs typeface="Courier" charset="0"/>
+              </a:rPr>
+              <a:t> </a:t>
+            </a:r>
+            <a:r>
+              <a:rPr lang="en-US" sz="1400" dirty="0">
+                <a:latin typeface="Courier" charset="0"/>
+                <a:ea typeface="Courier" charset="0"/>
+                <a:cs typeface="Courier" charset="0"/>
+              </a:rPr>
+              <a:t>  </a:t>
+            </a:r>
+            <a:r>
+              <a:rPr lang="en-US" sz="1400" dirty="0" smtClean="0">
+                <a:latin typeface="Courier" charset="0"/>
+                <a:ea typeface="Courier" charset="0"/>
+                <a:cs typeface="Courier" charset="0"/>
+              </a:rPr>
+              <a:t> </a:t>
+            </a:r>
+            <a:r>
+              <a:rPr lang="en-US" sz="1400" dirty="0">
+                <a:latin typeface="Courier" charset="0"/>
+                <a:ea typeface="Courier" charset="0"/>
+                <a:cs typeface="Courier" charset="0"/>
+              </a:rPr>
+              <a:t> # Number of tasks per </a:t>
+            </a:r>
+            <a:r>
+              <a:rPr lang="en-US" sz="1400" dirty="0" smtClean="0">
+                <a:latin typeface="Courier" charset="0"/>
+                <a:ea typeface="Courier" charset="0"/>
+                <a:cs typeface="Courier" charset="0"/>
+              </a:rPr>
+              <a:t>job; </a:t>
+            </a:r>
+            <a:r>
+              <a:rPr lang="en-US" sz="1400" dirty="0" err="1" smtClean="0">
+                <a:latin typeface="Courier" charset="0"/>
+                <a:ea typeface="Courier" charset="0"/>
+                <a:cs typeface="Courier" charset="0"/>
+              </a:rPr>
+              <a:t>ie</a:t>
+            </a:r>
+            <a:r>
+              <a:rPr lang="en-US" sz="1400" dirty="0" smtClean="0">
+                <a:latin typeface="Courier" charset="0"/>
+                <a:ea typeface="Courier" charset="0"/>
+                <a:cs typeface="Courier" charset="0"/>
+              </a:rPr>
+              <a:t> number of cores</a:t>
+            </a:r>
+            <a:endParaRPr lang="en-US" sz="1400" dirty="0">
+              <a:latin typeface="Courier" charset="0"/>
+              <a:ea typeface="Courier" charset="0"/>
+              <a:cs typeface="Courier" charset="0"/>
+            </a:endParaRPr>
+          </a:p>
+          <a:p>
+            <a:pPr marL="114300" indent="0">
+              <a:buNone/>
+            </a:pPr>
+            <a:r>
+              <a:rPr lang="en-US" sz="1400" dirty="0" smtClean="0">
+                <a:latin typeface="Courier" charset="0"/>
+                <a:ea typeface="Courier" charset="0"/>
+                <a:cs typeface="Courier" charset="0"/>
+              </a:rPr>
+              <a:t>#</a:t>
+            </a:r>
+            <a:r>
+              <a:rPr lang="en-US" sz="1400" dirty="0">
+                <a:latin typeface="Courier" charset="0"/>
+                <a:ea typeface="Courier" charset="0"/>
+                <a:cs typeface="Courier" charset="0"/>
+              </a:rPr>
+              <a:t>SBATCH --</a:t>
+            </a:r>
+            <a:r>
+              <a:rPr lang="en-US" sz="1400" dirty="0" smtClean="0">
+                <a:latin typeface="Courier" charset="0"/>
+                <a:ea typeface="Courier" charset="0"/>
+                <a:cs typeface="Courier" charset="0"/>
+              </a:rPr>
+              <a:t>time=0:02:00 </a:t>
+            </a:r>
+            <a:r>
+              <a:rPr lang="en-US" sz="1400" dirty="0">
+                <a:latin typeface="Courier" charset="0"/>
+                <a:ea typeface="Courier" charset="0"/>
+                <a:cs typeface="Courier" charset="0"/>
+              </a:rPr>
+              <a:t>              # Max wall time</a:t>
+            </a:r>
+          </a:p>
+          <a:p>
+            <a:pPr marL="114300" indent="0">
+              <a:buNone/>
+            </a:pPr>
+            <a:r>
+              <a:rPr lang="en-US" sz="1400" dirty="0">
+                <a:latin typeface="Courier" charset="0"/>
+                <a:ea typeface="Courier" charset="0"/>
+                <a:cs typeface="Courier" charset="0"/>
+              </a:rPr>
+              <a:t>#SBATCH </a:t>
+            </a:r>
+            <a:r>
+              <a:rPr lang="en-US" sz="1400" dirty="0" smtClean="0">
+                <a:latin typeface="Courier" charset="0"/>
+                <a:ea typeface="Courier" charset="0"/>
+                <a:cs typeface="Courier" charset="0"/>
+              </a:rPr>
+              <a:t>--reservation=parallelD1 </a:t>
+            </a:r>
+            <a:r>
+              <a:rPr lang="en-US" sz="1400" dirty="0">
+                <a:latin typeface="Courier" charset="0"/>
+                <a:ea typeface="Courier" charset="0"/>
+                <a:cs typeface="Courier" charset="0"/>
+              </a:rPr>
+              <a:t>    # Specify </a:t>
+            </a:r>
+            <a:r>
+              <a:rPr lang="en-US" sz="1400" dirty="0" smtClean="0">
+                <a:latin typeface="Courier" charset="0"/>
+                <a:ea typeface="Courier" charset="0"/>
+                <a:cs typeface="Courier" charset="0"/>
+              </a:rPr>
+              <a:t>reservation</a:t>
+            </a:r>
+            <a:endParaRPr lang="en-US" sz="1400" dirty="0">
+              <a:latin typeface="Courier" charset="0"/>
+              <a:ea typeface="Courier" charset="0"/>
+              <a:cs typeface="Courier" charset="0"/>
+            </a:endParaRPr>
+          </a:p>
+          <a:p>
+            <a:pPr marL="114300" indent="0">
+              <a:buNone/>
+            </a:pPr>
+            <a:r>
+              <a:rPr lang="en-US" sz="1400" dirty="0">
+                <a:latin typeface="Courier" charset="0"/>
+                <a:ea typeface="Courier" charset="0"/>
+                <a:cs typeface="Courier" charset="0"/>
+              </a:rPr>
+              <a:t>#SBATCH --partition=</a:t>
+            </a:r>
+            <a:r>
+              <a:rPr lang="en-US" sz="1400" dirty="0" err="1">
+                <a:latin typeface="Courier" charset="0"/>
+                <a:ea typeface="Courier" charset="0"/>
+                <a:cs typeface="Courier" charset="0"/>
+              </a:rPr>
+              <a:t>shas</a:t>
+            </a:r>
+            <a:r>
+              <a:rPr lang="en-US" sz="1400" dirty="0">
+                <a:latin typeface="Courier" charset="0"/>
+                <a:ea typeface="Courier" charset="0"/>
+                <a:cs typeface="Courier" charset="0"/>
+              </a:rPr>
+              <a:t>             # Specify Summit </a:t>
+            </a:r>
+            <a:r>
+              <a:rPr lang="en-US" sz="1400" dirty="0" err="1">
+                <a:latin typeface="Courier" charset="0"/>
+                <a:ea typeface="Courier" charset="0"/>
+                <a:cs typeface="Courier" charset="0"/>
+              </a:rPr>
+              <a:t>haswell</a:t>
+            </a:r>
+            <a:r>
+              <a:rPr lang="en-US" sz="1400" dirty="0">
+                <a:latin typeface="Courier" charset="0"/>
+                <a:ea typeface="Courier" charset="0"/>
+                <a:cs typeface="Courier" charset="0"/>
+              </a:rPr>
+              <a:t> nodes</a:t>
+            </a:r>
+          </a:p>
+          <a:p>
+            <a:pPr marL="114300" indent="0">
+              <a:buNone/>
+            </a:pPr>
+            <a:r>
+              <a:rPr lang="en-US" sz="1400" dirty="0" smtClean="0">
+                <a:latin typeface="Courier" charset="0"/>
+                <a:ea typeface="Courier" charset="0"/>
+                <a:cs typeface="Courier" charset="0"/>
+              </a:rPr>
+              <a:t>#</a:t>
+            </a:r>
+            <a:r>
+              <a:rPr lang="en-US" sz="1400" dirty="0">
+                <a:latin typeface="Courier" charset="0"/>
+                <a:ea typeface="Courier" charset="0"/>
+                <a:cs typeface="Courier" charset="0"/>
+              </a:rPr>
+              <a:t>SBATCH --</a:t>
+            </a:r>
+            <a:r>
+              <a:rPr lang="en-US" sz="1400" dirty="0" smtClean="0">
+                <a:latin typeface="Courier" charset="0"/>
+                <a:ea typeface="Courier" charset="0"/>
+                <a:cs typeface="Courier" charset="0"/>
+              </a:rPr>
+              <a:t>job-name=</a:t>
+            </a:r>
+            <a:r>
+              <a:rPr lang="en-US" sz="1400" dirty="0" err="1" smtClean="0">
+                <a:latin typeface="Courier" charset="0"/>
+                <a:ea typeface="Courier" charset="0"/>
+                <a:cs typeface="Courier" charset="0"/>
+              </a:rPr>
+              <a:t>mpi</a:t>
+            </a:r>
+            <a:r>
+              <a:rPr lang="en-US" sz="1400" dirty="0" smtClean="0">
+                <a:latin typeface="Courier" charset="0"/>
+                <a:ea typeface="Courier" charset="0"/>
+                <a:cs typeface="Courier" charset="0"/>
+              </a:rPr>
+              <a:t>     </a:t>
+            </a:r>
+            <a:r>
+              <a:rPr lang="en-US" sz="1400" dirty="0">
+                <a:latin typeface="Courier" charset="0"/>
+                <a:ea typeface="Courier" charset="0"/>
+                <a:cs typeface="Courier" charset="0"/>
+              </a:rPr>
+              <a:t>          # Job </a:t>
+            </a:r>
+            <a:r>
+              <a:rPr lang="en-US" sz="1400" dirty="0" smtClean="0">
+                <a:latin typeface="Courier" charset="0"/>
+                <a:ea typeface="Courier" charset="0"/>
+                <a:cs typeface="Courier" charset="0"/>
+              </a:rPr>
+              <a:t>name</a:t>
+            </a:r>
+            <a:endParaRPr lang="en-US" sz="1400" dirty="0">
+              <a:latin typeface="Courier" charset="0"/>
+              <a:ea typeface="Courier" charset="0"/>
+              <a:cs typeface="Courier" charset="0"/>
+            </a:endParaRPr>
+          </a:p>
+          <a:p>
+            <a:pPr marL="114300" indent="0">
+              <a:buNone/>
+            </a:pPr>
+            <a:r>
+              <a:rPr lang="en-US" sz="1400" dirty="0">
+                <a:latin typeface="Courier" charset="0"/>
+                <a:ea typeface="Courier" charset="0"/>
+                <a:cs typeface="Courier" charset="0"/>
+              </a:rPr>
+              <a:t>#SBATCH --</a:t>
+            </a:r>
+            <a:r>
+              <a:rPr lang="en-US" sz="1400" dirty="0" smtClean="0">
+                <a:latin typeface="Courier" charset="0"/>
+                <a:ea typeface="Courier" charset="0"/>
+                <a:cs typeface="Courier" charset="0"/>
+              </a:rPr>
+              <a:t>output=</a:t>
+            </a:r>
+            <a:r>
+              <a:rPr lang="en-US" sz="1400" dirty="0" err="1" smtClean="0">
+                <a:latin typeface="Courier" charset="0"/>
+                <a:ea typeface="Courier" charset="0"/>
+                <a:cs typeface="Courier" charset="0"/>
+              </a:rPr>
+              <a:t>mpi</a:t>
+            </a:r>
+            <a:r>
+              <a:rPr lang="en-US" sz="1400" dirty="0" smtClean="0">
+                <a:latin typeface="Courier" charset="0"/>
+                <a:ea typeface="Courier" charset="0"/>
+                <a:cs typeface="Courier" charset="0"/>
+              </a:rPr>
+              <a:t>.%</a:t>
+            </a:r>
+            <a:r>
+              <a:rPr lang="en-US" sz="1400" dirty="0" err="1" smtClean="0">
+                <a:latin typeface="Courier" charset="0"/>
+                <a:ea typeface="Courier" charset="0"/>
+                <a:cs typeface="Courier" charset="0"/>
+              </a:rPr>
+              <a:t>j.out</a:t>
+            </a:r>
+            <a:r>
+              <a:rPr lang="en-US" sz="1400" dirty="0" smtClean="0">
+                <a:latin typeface="Courier" charset="0"/>
+                <a:ea typeface="Courier" charset="0"/>
+                <a:cs typeface="Courier" charset="0"/>
+              </a:rPr>
+              <a:t>      </a:t>
+            </a:r>
+            <a:r>
+              <a:rPr lang="en-US" sz="1400" dirty="0">
+                <a:latin typeface="Courier" charset="0"/>
+                <a:ea typeface="Courier" charset="0"/>
+                <a:cs typeface="Courier" charset="0"/>
+              </a:rPr>
+              <a:t>    # Output file name with Job </a:t>
+            </a:r>
+            <a:r>
+              <a:rPr lang="en-US" sz="1400" dirty="0" smtClean="0">
+                <a:latin typeface="Courier" charset="0"/>
+                <a:ea typeface="Courier" charset="0"/>
+                <a:cs typeface="Courier" charset="0"/>
+              </a:rPr>
+              <a:t>ID</a:t>
+            </a:r>
+            <a:r>
+              <a:rPr lang="en-US" sz="1400" dirty="0">
+                <a:latin typeface="Courier" charset="0"/>
+                <a:ea typeface="Courier" charset="0"/>
+                <a:cs typeface="Courier" charset="0"/>
+              </a:rPr>
+              <a:t> </a:t>
+            </a:r>
+          </a:p>
+          <a:p>
+            <a:pPr marL="114300" indent="0">
+              <a:buNone/>
+            </a:pPr>
+            <a:endParaRPr lang="en-US" sz="1400" dirty="0" smtClean="0">
+              <a:latin typeface="Courier" charset="0"/>
+              <a:ea typeface="Courier" charset="0"/>
+              <a:cs typeface="Courier" charset="0"/>
+            </a:endParaRPr>
+          </a:p>
+          <a:p>
+            <a:pPr marL="114300" indent="0">
+              <a:buNone/>
+            </a:pPr>
+            <a:r>
+              <a:rPr lang="en-US" sz="1400" dirty="0" smtClean="0">
+                <a:latin typeface="Courier" charset="0"/>
+                <a:ea typeface="Courier" charset="0"/>
+                <a:cs typeface="Courier" charset="0"/>
+              </a:rPr>
+              <a:t>cd /home/$USER/</a:t>
+            </a:r>
+            <a:r>
+              <a:rPr lang="en-US" sz="1400" dirty="0" err="1" smtClean="0">
+                <a:latin typeface="Courier" charset="0"/>
+                <a:ea typeface="Courier" charset="0"/>
+                <a:cs typeface="Courier" charset="0"/>
+              </a:rPr>
+              <a:t>Parallelization_Workshop</a:t>
+            </a:r>
+            <a:r>
+              <a:rPr lang="en-US" sz="1400" dirty="0" smtClean="0">
+                <a:latin typeface="Courier" charset="0"/>
+                <a:ea typeface="Courier" charset="0"/>
+                <a:cs typeface="Courier" charset="0"/>
+              </a:rPr>
+              <a:t>/Day1/</a:t>
+            </a:r>
+            <a:r>
+              <a:rPr lang="en-US" sz="1400" dirty="0" err="1" smtClean="0">
+                <a:latin typeface="Courier" charset="0"/>
+                <a:ea typeface="Courier" charset="0"/>
+                <a:cs typeface="Courier" charset="0"/>
+              </a:rPr>
               <a:t>Slurm</a:t>
             </a:r>
-            <a:r>
-              <a:rPr lang="en-US" dirty="0" smtClean="0"/>
-              <a:t> commands and directives</a:t>
-            </a:r>
-            <a:endParaRPr lang="en-US" dirty="0"/>
-          </a:p>
-          <a:p>
-            <a:r>
-              <a:rPr lang="en-US" dirty="0" smtClean="0"/>
-              <a:t>Submitting our first job!</a:t>
-            </a:r>
-          </a:p>
-          <a:p>
-            <a:r>
-              <a:rPr lang="en-US" dirty="0" smtClean="0"/>
-              <a:t>Summit partitions and </a:t>
-            </a:r>
-            <a:r>
-              <a:rPr lang="en-US" dirty="0" err="1" smtClean="0"/>
-              <a:t>QoS</a:t>
-            </a:r>
-            <a:endParaRPr lang="en-US" dirty="0" smtClean="0"/>
-          </a:p>
-          <a:p>
-            <a:r>
-              <a:rPr lang="en-US" dirty="0" smtClean="0"/>
-              <a:t>Interactive jobs</a:t>
-            </a:r>
-          </a:p>
-          <a:p>
-            <a:r>
-              <a:rPr lang="en-US" dirty="0" err="1" smtClean="0"/>
-              <a:t>OpenMP</a:t>
-            </a:r>
-            <a:r>
-              <a:rPr lang="en-US" dirty="0" smtClean="0"/>
-              <a:t> parallel job</a:t>
-            </a:r>
-          </a:p>
-          <a:p>
-            <a:r>
-              <a:rPr lang="en-US" dirty="0" smtClean="0"/>
-              <a:t>MPI parallel </a:t>
-            </a:r>
-            <a:r>
-              <a:rPr lang="en-US" dirty="0" smtClean="0"/>
-              <a:t>job</a:t>
-            </a:r>
-          </a:p>
-          <a:p>
-            <a:r>
-              <a:rPr lang="en-US" dirty="0" smtClean="0"/>
-              <a:t>Job arrays</a:t>
-            </a:r>
-            <a:endParaRPr lang="en-US" dirty="0" smtClean="0"/>
-          </a:p>
-          <a:p>
-            <a:r>
-              <a:rPr lang="en-US" dirty="0" smtClean="0"/>
-              <a:t>Creating pipelines with job dependencies</a:t>
-            </a:r>
+            <a:endParaRPr lang="en-US" sz="1400" dirty="0" smtClean="0">
+              <a:latin typeface="Courier" charset="0"/>
+              <a:ea typeface="Courier" charset="0"/>
+              <a:cs typeface="Courier" charset="0"/>
+            </a:endParaRPr>
+          </a:p>
+          <a:p>
+            <a:pPr marL="114300" indent="0">
+              <a:buNone/>
+            </a:pPr>
+            <a:r>
+              <a:rPr lang="en-US" sz="1400" dirty="0">
+                <a:latin typeface="Courier" charset="0"/>
+                <a:ea typeface="Courier" charset="0"/>
+                <a:cs typeface="Courier" charset="0"/>
+              </a:rPr>
+              <a:t>m</a:t>
+            </a:r>
+            <a:r>
+              <a:rPr lang="en-US" sz="1400" dirty="0" smtClean="0">
+                <a:latin typeface="Courier" charset="0"/>
+                <a:ea typeface="Courier" charset="0"/>
+                <a:cs typeface="Courier" charset="0"/>
+              </a:rPr>
+              <a:t>odule purge</a:t>
+            </a:r>
+          </a:p>
+          <a:p>
+            <a:pPr marL="114300" indent="0">
+              <a:buNone/>
+            </a:pPr>
+            <a:r>
+              <a:rPr lang="en-US" sz="1400" dirty="0">
+                <a:latin typeface="Courier" charset="0"/>
+                <a:ea typeface="Courier" charset="0"/>
+                <a:cs typeface="Courier" charset="0"/>
+              </a:rPr>
+              <a:t>m</a:t>
+            </a:r>
+            <a:r>
+              <a:rPr lang="en-US" sz="1400" dirty="0" smtClean="0">
+                <a:latin typeface="Courier" charset="0"/>
+                <a:ea typeface="Courier" charset="0"/>
+                <a:cs typeface="Courier" charset="0"/>
+              </a:rPr>
+              <a:t>odule load intel/16.0.3</a:t>
+            </a:r>
+          </a:p>
+          <a:p>
+            <a:pPr marL="114300" indent="0">
+              <a:buNone/>
+            </a:pPr>
+            <a:r>
+              <a:rPr lang="en-US" sz="1400" dirty="0">
+                <a:latin typeface="Courier" charset="0"/>
+                <a:ea typeface="Courier" charset="0"/>
+                <a:cs typeface="Courier" charset="0"/>
+              </a:rPr>
+              <a:t>m</a:t>
+            </a:r>
+            <a:r>
+              <a:rPr lang="en-US" sz="1400" dirty="0" smtClean="0">
+                <a:latin typeface="Courier" charset="0"/>
+                <a:ea typeface="Courier" charset="0"/>
+                <a:cs typeface="Courier" charset="0"/>
+              </a:rPr>
+              <a:t>odule load </a:t>
+            </a:r>
+            <a:r>
+              <a:rPr lang="en-US" sz="1400" dirty="0" err="1" smtClean="0">
+                <a:latin typeface="Courier" charset="0"/>
+                <a:ea typeface="Courier" charset="0"/>
+                <a:cs typeface="Courier" charset="0"/>
+              </a:rPr>
+              <a:t>impi</a:t>
+            </a:r>
+            <a:endParaRPr lang="en-US" sz="1400" dirty="0">
+              <a:latin typeface="Courier" charset="0"/>
+              <a:ea typeface="Courier" charset="0"/>
+              <a:cs typeface="Courier" charset="0"/>
+            </a:endParaRPr>
+          </a:p>
+          <a:p>
+            <a:pPr marL="114300" indent="0">
+              <a:buNone/>
+            </a:pPr>
+            <a:r>
+              <a:rPr lang="en-US" sz="1400" dirty="0" smtClean="0">
+                <a:latin typeface="Courier" charset="0"/>
+                <a:ea typeface="Courier" charset="0"/>
+                <a:cs typeface="Courier" charset="0"/>
+              </a:rPr>
+              <a:t>./</a:t>
+            </a:r>
+            <a:r>
+              <a:rPr lang="en-US" sz="1400" dirty="0" err="1" smtClean="0">
+                <a:latin typeface="Courier" charset="0"/>
+                <a:ea typeface="Courier" charset="0"/>
+                <a:cs typeface="Courier" charset="0"/>
+              </a:rPr>
+              <a:t>mpi-hello.x</a:t>
+            </a:r>
+            <a:r>
+              <a:rPr lang="en-US" sz="1400" dirty="0" smtClean="0">
+                <a:latin typeface="Courier" charset="0"/>
+                <a:ea typeface="Courier" charset="0"/>
+                <a:cs typeface="Courier" charset="0"/>
+              </a:rPr>
+              <a:t> </a:t>
+            </a:r>
+            <a:r>
+              <a:rPr lang="mr-IN" sz="1400" dirty="0" smtClean="0">
+                <a:latin typeface="Courier" charset="0"/>
+                <a:ea typeface="Courier" charset="0"/>
+                <a:cs typeface="Courier" charset="0"/>
+              </a:rPr>
+              <a:t>–</a:t>
+            </a:r>
+            <a:r>
+              <a:rPr lang="en-US" sz="1400" dirty="0" smtClean="0">
+                <a:latin typeface="Courier" charset="0"/>
+                <a:ea typeface="Courier" charset="0"/>
+                <a:cs typeface="Courier" charset="0"/>
+              </a:rPr>
+              <a:t>np 24</a:t>
+            </a:r>
+            <a:endParaRPr lang="en-US" sz="1400" dirty="0">
+              <a:latin typeface="Courier" charset="0"/>
+              <a:ea typeface="Courier" charset="0"/>
+              <a:cs typeface="Courier" charset="0"/>
+            </a:endParaRPr>
           </a:p>
           <a:p>
             <a:endParaRPr lang="en-US" dirty="0"/>
@@ -21367,7 +22399,7 @@
     </p:spTree>
     <p:extLst>
       <p:ext uri="{BB962C8B-B14F-4D97-AF65-F5344CB8AC3E}">
-        <p14:creationId xmlns:p14="http://schemas.microsoft.com/office/powerpoint/2010/main" val="2130887065"/>
+        <p14:creationId xmlns:p14="http://schemas.microsoft.com/office/powerpoint/2010/main" val="422307122"/>
       </p:ext>
     </p:extLst>
   </p:cSld>
@@ -21422,7 +22454,7 @@
                   <a:schemeClr val="tx2"/>
                 </a:solidFill>
               </a:rPr>
-              <a:t>Thank you!</a:t>
+              <a:t>Job arrays</a:t>
             </a:r>
             <a:endParaRPr lang="en-US" dirty="0">
               <a:solidFill>
@@ -21444,6 +22476,2521 @@
         </p:nvSpPr>
         <p:spPr/>
         <p:txBody>
+          <a:bodyPr vert="horz" lIns="91440" tIns="45720" rIns="91440" bIns="45720" rtlCol="0" anchor="t">
+            <a:normAutofit lnSpcReduction="10000"/>
+          </a:bodyPr>
+          <a:lstStyle/>
+          <a:p>
+            <a:r>
+              <a:rPr lang="en-US" dirty="0" smtClean="0"/>
+              <a:t>A collection of batch jobs with identical resource requirements</a:t>
+            </a:r>
+          </a:p>
+          <a:p>
+            <a:r>
+              <a:rPr lang="en-US" dirty="0" smtClean="0"/>
+              <a:t>Useful for running the same program against multiple input data files</a:t>
+            </a:r>
+          </a:p>
+          <a:p>
+            <a:r>
+              <a:rPr lang="en-US" dirty="0" smtClean="0"/>
+              <a:t>Easy way to submit multiple independent jobs</a:t>
+            </a:r>
+          </a:p>
+          <a:p>
+            <a:r>
+              <a:rPr lang="en-US" dirty="0" smtClean="0"/>
+              <a:t>Identified with main </a:t>
+            </a:r>
+            <a:r>
+              <a:rPr lang="en-US" dirty="0" err="1" smtClean="0"/>
+              <a:t>JobID</a:t>
+            </a:r>
+            <a:r>
+              <a:rPr lang="en-US" dirty="0" smtClean="0"/>
+              <a:t> plus </a:t>
+            </a:r>
+            <a:r>
+              <a:rPr lang="en-US" dirty="0" err="1" smtClean="0"/>
+              <a:t>TaskID</a:t>
+            </a:r>
+            <a:r>
+              <a:rPr lang="en-US" dirty="0" smtClean="0"/>
+              <a:t> (</a:t>
+            </a:r>
+            <a:r>
+              <a:rPr lang="en-US" dirty="0" err="1" smtClean="0"/>
+              <a:t>ie</a:t>
+            </a:r>
+            <a:r>
+              <a:rPr lang="en-US" dirty="0" smtClean="0"/>
+              <a:t>, index number)</a:t>
+            </a:r>
+            <a:endParaRPr lang="en-US" dirty="0" smtClean="0"/>
+          </a:p>
+          <a:p>
+            <a:endParaRPr lang="en-US" dirty="0"/>
+          </a:p>
+          <a:p>
+            <a:r>
+              <a:rPr lang="en-US" dirty="0" smtClean="0">
+                <a:latin typeface="Courier" charset="0"/>
+                <a:ea typeface="Courier" charset="0"/>
+                <a:cs typeface="Courier" charset="0"/>
+              </a:rPr>
+              <a:t>--array=&lt;index-range&gt;</a:t>
+            </a:r>
+          </a:p>
+          <a:p>
+            <a:r>
+              <a:rPr lang="en-US" dirty="0"/>
+              <a:t> </a:t>
+            </a:r>
+            <a:r>
+              <a:rPr lang="en-US" dirty="0" smtClean="0"/>
+              <a:t>  (can be, </a:t>
+            </a:r>
+            <a:r>
+              <a:rPr lang="en-US" dirty="0" err="1" smtClean="0"/>
+              <a:t>eg</a:t>
+            </a:r>
+            <a:r>
+              <a:rPr lang="en-US" dirty="0" smtClean="0"/>
+              <a:t>, </a:t>
+            </a:r>
+            <a:r>
+              <a:rPr lang="en-US" dirty="0" smtClean="0">
+                <a:latin typeface="Courier" charset="0"/>
+                <a:ea typeface="Courier" charset="0"/>
+                <a:cs typeface="Courier" charset="0"/>
+              </a:rPr>
+              <a:t>1-10</a:t>
+            </a:r>
+            <a:r>
+              <a:rPr lang="en-US" dirty="0" smtClean="0"/>
+              <a:t> , </a:t>
+            </a:r>
+            <a:r>
+              <a:rPr lang="en-US" dirty="0" smtClean="0">
+                <a:latin typeface="Courier" charset="0"/>
+                <a:ea typeface="Courier" charset="0"/>
+                <a:cs typeface="Courier" charset="0"/>
+              </a:rPr>
+              <a:t>1,2,3,5,8,13</a:t>
+            </a:r>
+            <a:r>
+              <a:rPr lang="en-US" dirty="0" smtClean="0"/>
+              <a:t> , </a:t>
+            </a:r>
+            <a:r>
+              <a:rPr lang="en-US" dirty="0" smtClean="0">
+                <a:latin typeface="Courier" charset="0"/>
+                <a:ea typeface="Courier" charset="0"/>
+                <a:cs typeface="Courier" charset="0"/>
+              </a:rPr>
+              <a:t>1-9:2</a:t>
+            </a:r>
+            <a:r>
+              <a:rPr lang="en-US" dirty="0" smtClean="0"/>
+              <a:t> )</a:t>
+            </a:r>
+          </a:p>
+          <a:p>
+            <a:r>
+              <a:rPr lang="en-US" dirty="0" smtClean="0">
+                <a:latin typeface="Courier" charset="0"/>
+                <a:ea typeface="Courier" charset="0"/>
+                <a:cs typeface="Courier" charset="0"/>
+              </a:rPr>
+              <a:t>--output=</a:t>
+            </a:r>
+            <a:r>
+              <a:rPr lang="en-US" dirty="0" err="1" smtClean="0">
+                <a:latin typeface="Courier" charset="0"/>
+                <a:ea typeface="Courier" charset="0"/>
+                <a:cs typeface="Courier" charset="0"/>
+              </a:rPr>
+              <a:t>myjob</a:t>
+            </a:r>
+            <a:r>
+              <a:rPr lang="en-US" dirty="0" smtClean="0">
+                <a:latin typeface="Courier" charset="0"/>
+                <a:ea typeface="Courier" charset="0"/>
+                <a:cs typeface="Courier" charset="0"/>
+              </a:rPr>
+              <a:t>.%A_%</a:t>
+            </a:r>
+            <a:r>
+              <a:rPr lang="en-US" dirty="0" err="1" smtClean="0">
+                <a:latin typeface="Courier" charset="0"/>
+                <a:ea typeface="Courier" charset="0"/>
+                <a:cs typeface="Courier" charset="0"/>
+              </a:rPr>
+              <a:t>a.out</a:t>
+            </a:r>
+            <a:endParaRPr lang="en-US" dirty="0" smtClean="0">
+              <a:latin typeface="Courier" charset="0"/>
+              <a:ea typeface="Courier" charset="0"/>
+              <a:cs typeface="Courier" charset="0"/>
+            </a:endParaRPr>
+          </a:p>
+          <a:p>
+            <a:r>
+              <a:rPr lang="en-US" dirty="0" smtClean="0">
+                <a:latin typeface="Courier" charset="0"/>
+                <a:ea typeface="Courier" charset="0"/>
+                <a:cs typeface="Courier" charset="0"/>
+              </a:rPr>
+              <a:t>$SLURM_ARRAY_TASK_ID</a:t>
+            </a:r>
+            <a:r>
+              <a:rPr lang="en-US" dirty="0" smtClean="0"/>
+              <a:t> variable</a:t>
+            </a:r>
+            <a:endParaRPr lang="en-US" dirty="0" smtClean="0"/>
+          </a:p>
+          <a:p>
+            <a:endParaRPr lang="en-US" dirty="0"/>
+          </a:p>
+          <a:p>
+            <a:endParaRPr lang="en-US" dirty="0"/>
+          </a:p>
+        </p:txBody>
+      </p:sp>
+      <p:sp>
+        <p:nvSpPr>
+          <p:cNvPr id="4" name="Date Placeholder 3"/>
+          <p:cNvSpPr>
+            <a:spLocks noGrp="1"/>
+          </p:cNvSpPr>
+          <p:nvPr>
+            <p:ph type="dt" sz="half" idx="10"/>
+          </p:nvPr>
+        </p:nvSpPr>
+        <p:spPr/>
+        <p:txBody>
+          <a:bodyPr/>
+          <a:lstStyle/>
+          <a:p>
+            <a:r>
+              <a:rPr lang="en-US" smtClean="0"/>
+              <a:t>5/15/17</a:t>
+            </a:r>
+            <a:endParaRPr lang="en-US"/>
+          </a:p>
+        </p:txBody>
+      </p:sp>
+      <p:sp>
+        <p:nvSpPr>
+          <p:cNvPr id="5" name="Footer Placeholder 4"/>
+          <p:cNvSpPr>
+            <a:spLocks noGrp="1"/>
+          </p:cNvSpPr>
+          <p:nvPr>
+            <p:ph type="ftr" sz="quarter" idx="11"/>
+          </p:nvPr>
+        </p:nvSpPr>
+        <p:spPr/>
+        <p:txBody>
+          <a:bodyPr/>
+          <a:lstStyle/>
+          <a:p>
+            <a:r>
+              <a:rPr lang="en-US" smtClean="0"/>
+              <a:t>Parallel workshop</a:t>
+            </a:r>
+            <a:endParaRPr lang="en-US"/>
+          </a:p>
+        </p:txBody>
+      </p:sp>
+      <p:sp>
+        <p:nvSpPr>
+          <p:cNvPr id="6" name="Slide Number Placeholder 5"/>
+          <p:cNvSpPr>
+            <a:spLocks noGrp="1"/>
+          </p:cNvSpPr>
+          <p:nvPr>
+            <p:ph type="sldNum" sz="quarter" idx="4"/>
+          </p:nvPr>
+        </p:nvSpPr>
+        <p:spPr/>
+        <p:txBody>
+          <a:bodyPr/>
+          <a:lstStyle/>
+          <a:p>
+            <a:fld id="{F81D5560-9D92-7847-90AE-DC1482349ABE}" type="slidenum">
+              <a:rPr lang="en-US" smtClean="0"/>
+              <a:t>23</a:t>
+            </a:fld>
+            <a:endParaRPr lang="en-US"/>
+          </a:p>
+        </p:txBody>
+      </p:sp>
+    </p:spTree>
+    <p:extLst>
+      <p:ext uri="{BB962C8B-B14F-4D97-AF65-F5344CB8AC3E}">
+        <p14:creationId xmlns:p14="http://schemas.microsoft.com/office/powerpoint/2010/main" val="2130887065"/>
+      </p:ext>
+    </p:extLst>
+  </p:cSld>
+  <p:clrMapOvr>
+    <a:masterClrMapping/>
+  </p:clrMapOvr>
+  <p:timing>
+    <p:tnLst>
+      <p:par>
+        <p:cTn id="1" dur="indefinite" restart="never" nodeType="tmRoot"/>
+      </p:par>
+    </p:tnLst>
+  </p:timing>
+</p:sld>
+</file>
+
+<file path=ppt/slides/slide24.xml><?xml version="1.0" encoding="utf-8"?>
+<p:sld xmlns:a="http://schemas.openxmlformats.org/drawingml/2006/main" xmlns:r="http://schemas.openxmlformats.org/officeDocument/2006/relationships" xmlns:p="http://schemas.openxmlformats.org/presentationml/2006/main">
+  <p:cSld>
+    <p:spTree>
+      <p:nvGrpSpPr>
+        <p:cNvPr id="1" name=""/>
+        <p:cNvGrpSpPr/>
+        <p:nvPr/>
+      </p:nvGrpSpPr>
+      <p:grpSpPr>
+        <a:xfrm>
+          <a:off x="0" y="0"/>
+          <a:ext cx="0" cy="0"/>
+          <a:chOff x="0" y="0"/>
+          <a:chExt cx="0" cy="0"/>
+        </a:xfrm>
+      </p:grpSpPr>
+      <p:sp>
+        <p:nvSpPr>
+          <p:cNvPr id="2" name="Title 1"/>
+          <p:cNvSpPr>
+            <a:spLocks noGrp="1"/>
+          </p:cNvSpPr>
+          <p:nvPr>
+            <p:ph type="title"/>
+          </p:nvPr>
+        </p:nvSpPr>
+        <p:spPr/>
+        <p:txBody>
+          <a:bodyPr/>
+          <a:lstStyle/>
+          <a:p>
+            <a:r>
+              <a:rPr lang="en-US" dirty="0" smtClean="0">
+                <a:solidFill>
+                  <a:schemeClr val="tx2"/>
+                </a:solidFill>
+              </a:rPr>
+              <a:t>Job array example</a:t>
+            </a:r>
+            <a:endParaRPr lang="en-US" dirty="0">
+              <a:solidFill>
+                <a:schemeClr val="tx2"/>
+              </a:solidFill>
+            </a:endParaRPr>
+          </a:p>
+        </p:txBody>
+      </p:sp>
+      <p:sp>
+        <p:nvSpPr>
+          <p:cNvPr id="3" name="Content Placeholder 2"/>
+          <p:cNvSpPr>
+            <a:spLocks noGrp="1"/>
+          </p:cNvSpPr>
+          <p:nvPr>
+            <p:ph idx="1"/>
+          </p:nvPr>
+        </p:nvSpPr>
+        <p:spPr/>
+        <p:txBody>
+          <a:bodyPr vert="horz" lIns="91440" tIns="45720" rIns="91440" bIns="45720" rtlCol="0" anchor="t">
+            <a:normAutofit/>
+          </a:bodyPr>
+          <a:lstStyle/>
+          <a:p>
+            <a:pPr marL="114300" indent="0">
+              <a:buNone/>
+            </a:pPr>
+            <a:r>
+              <a:rPr lang="en-US" sz="1400" dirty="0">
+                <a:latin typeface="Courier" charset="0"/>
+                <a:ea typeface="Courier" charset="0"/>
+                <a:cs typeface="Courier" charset="0"/>
+              </a:rPr>
+              <a:t>#!/</a:t>
+            </a:r>
+            <a:r>
+              <a:rPr lang="en-US" sz="1400" dirty="0" smtClean="0">
+                <a:latin typeface="Courier" charset="0"/>
+                <a:ea typeface="Courier" charset="0"/>
+                <a:cs typeface="Courier" charset="0"/>
+              </a:rPr>
+              <a:t>bin/bash</a:t>
+            </a:r>
+          </a:p>
+          <a:p>
+            <a:pPr marL="114300" indent="0">
+              <a:buNone/>
+            </a:pPr>
+            <a:r>
+              <a:rPr lang="en-US" sz="1400" dirty="0">
+                <a:latin typeface="Courier" charset="0"/>
+                <a:ea typeface="Courier" charset="0"/>
+                <a:cs typeface="Courier" charset="0"/>
+              </a:rPr>
+              <a:t>#SBATCH --</a:t>
+            </a:r>
+            <a:r>
+              <a:rPr lang="en-US" sz="1400" dirty="0" smtClean="0">
+                <a:latin typeface="Courier" charset="0"/>
+                <a:ea typeface="Courier" charset="0"/>
+                <a:cs typeface="Courier" charset="0"/>
+              </a:rPr>
+              <a:t>nodes=1</a:t>
+            </a:r>
+            <a:r>
+              <a:rPr lang="en-US" sz="1400" dirty="0">
+                <a:latin typeface="Courier" charset="0"/>
+                <a:ea typeface="Courier" charset="0"/>
+                <a:cs typeface="Courier" charset="0"/>
+              </a:rPr>
+              <a:t>            </a:t>
+            </a:r>
+            <a:r>
+              <a:rPr lang="en-US" sz="1400" dirty="0" smtClean="0">
+                <a:latin typeface="Courier" charset="0"/>
+                <a:ea typeface="Courier" charset="0"/>
+                <a:cs typeface="Courier" charset="0"/>
+              </a:rPr>
+              <a:t># </a:t>
+            </a:r>
+            <a:r>
+              <a:rPr lang="en-US" sz="1400" dirty="0">
+                <a:latin typeface="Courier" charset="0"/>
+                <a:ea typeface="Courier" charset="0"/>
+                <a:cs typeface="Courier" charset="0"/>
+              </a:rPr>
+              <a:t>Number of requested </a:t>
+            </a:r>
+            <a:r>
+              <a:rPr lang="en-US" sz="1400" dirty="0" smtClean="0">
+                <a:latin typeface="Courier" charset="0"/>
+                <a:ea typeface="Courier" charset="0"/>
+                <a:cs typeface="Courier" charset="0"/>
+              </a:rPr>
+              <a:t>nodes</a:t>
+            </a:r>
+          </a:p>
+          <a:p>
+            <a:pPr marL="114300" indent="0">
+              <a:buNone/>
+            </a:pPr>
+            <a:r>
+              <a:rPr lang="en-US" sz="1400" dirty="0">
+                <a:latin typeface="Courier" charset="0"/>
+                <a:ea typeface="Courier" charset="0"/>
+                <a:cs typeface="Courier" charset="0"/>
+              </a:rPr>
+              <a:t>#SBATCH --</a:t>
+            </a:r>
+            <a:r>
+              <a:rPr lang="en-US" sz="1400" dirty="0" err="1" smtClean="0">
+                <a:latin typeface="Courier" charset="0"/>
+                <a:ea typeface="Courier" charset="0"/>
+                <a:cs typeface="Courier" charset="0"/>
+              </a:rPr>
+              <a:t>ntasks</a:t>
+            </a:r>
+            <a:r>
+              <a:rPr lang="en-US" sz="1400" dirty="0" smtClean="0">
+                <a:latin typeface="Courier" charset="0"/>
+                <a:ea typeface="Courier" charset="0"/>
+                <a:cs typeface="Courier" charset="0"/>
+              </a:rPr>
+              <a:t>=1   </a:t>
+            </a:r>
+            <a:r>
+              <a:rPr lang="en-US" sz="1400" dirty="0">
+                <a:latin typeface="Courier" charset="0"/>
+                <a:ea typeface="Courier" charset="0"/>
+                <a:cs typeface="Courier" charset="0"/>
+              </a:rPr>
+              <a:t>   </a:t>
+            </a:r>
+            <a:r>
+              <a:rPr lang="en-US" sz="1400" dirty="0" smtClean="0">
+                <a:latin typeface="Courier" charset="0"/>
+                <a:ea typeface="Courier" charset="0"/>
+                <a:cs typeface="Courier" charset="0"/>
+              </a:rPr>
+              <a:t> </a:t>
+            </a:r>
+            <a:r>
+              <a:rPr lang="en-US" sz="1400" dirty="0">
+                <a:latin typeface="Courier" charset="0"/>
+                <a:ea typeface="Courier" charset="0"/>
+                <a:cs typeface="Courier" charset="0"/>
+              </a:rPr>
+              <a:t>  </a:t>
+            </a:r>
+            <a:r>
+              <a:rPr lang="en-US" sz="1400" dirty="0" smtClean="0">
+                <a:latin typeface="Courier" charset="0"/>
+                <a:ea typeface="Courier" charset="0"/>
+                <a:cs typeface="Courier" charset="0"/>
+              </a:rPr>
+              <a:t> </a:t>
+            </a:r>
+            <a:r>
+              <a:rPr lang="en-US" sz="1400" dirty="0">
+                <a:latin typeface="Courier" charset="0"/>
+                <a:ea typeface="Courier" charset="0"/>
+                <a:cs typeface="Courier" charset="0"/>
+              </a:rPr>
+              <a:t> # Number of tasks per </a:t>
+            </a:r>
+            <a:r>
+              <a:rPr lang="en-US" sz="1400" dirty="0" smtClean="0">
+                <a:latin typeface="Courier" charset="0"/>
+                <a:ea typeface="Courier" charset="0"/>
+                <a:cs typeface="Courier" charset="0"/>
+              </a:rPr>
+              <a:t>job; </a:t>
+            </a:r>
+            <a:r>
+              <a:rPr lang="en-US" sz="1400" dirty="0" err="1" smtClean="0">
+                <a:latin typeface="Courier" charset="0"/>
+                <a:ea typeface="Courier" charset="0"/>
+                <a:cs typeface="Courier" charset="0"/>
+              </a:rPr>
+              <a:t>ie</a:t>
+            </a:r>
+            <a:r>
+              <a:rPr lang="en-US" sz="1400" dirty="0" smtClean="0">
+                <a:latin typeface="Courier" charset="0"/>
+                <a:ea typeface="Courier" charset="0"/>
+                <a:cs typeface="Courier" charset="0"/>
+              </a:rPr>
+              <a:t> number of cores</a:t>
+            </a:r>
+            <a:endParaRPr lang="en-US" sz="1400" dirty="0">
+              <a:latin typeface="Courier" charset="0"/>
+              <a:ea typeface="Courier" charset="0"/>
+              <a:cs typeface="Courier" charset="0"/>
+            </a:endParaRPr>
+          </a:p>
+          <a:p>
+            <a:pPr marL="114300" indent="0">
+              <a:buNone/>
+            </a:pPr>
+            <a:r>
+              <a:rPr lang="en-US" sz="1400" dirty="0" smtClean="0">
+                <a:latin typeface="Courier" charset="0"/>
+                <a:ea typeface="Courier" charset="0"/>
+                <a:cs typeface="Courier" charset="0"/>
+              </a:rPr>
+              <a:t>#</a:t>
+            </a:r>
+            <a:r>
+              <a:rPr lang="en-US" sz="1400" dirty="0">
+                <a:latin typeface="Courier" charset="0"/>
+                <a:ea typeface="Courier" charset="0"/>
+                <a:cs typeface="Courier" charset="0"/>
+              </a:rPr>
+              <a:t>SBATCH --</a:t>
+            </a:r>
+            <a:r>
+              <a:rPr lang="en-US" sz="1400" dirty="0" smtClean="0">
+                <a:latin typeface="Courier" charset="0"/>
+                <a:ea typeface="Courier" charset="0"/>
+                <a:cs typeface="Courier" charset="0"/>
+              </a:rPr>
+              <a:t>time=0:22:00 </a:t>
+            </a:r>
+            <a:r>
+              <a:rPr lang="en-US" sz="1400" dirty="0">
+                <a:latin typeface="Courier" charset="0"/>
+                <a:ea typeface="Courier" charset="0"/>
+                <a:cs typeface="Courier" charset="0"/>
+              </a:rPr>
+              <a:t>              # Max wall time</a:t>
+            </a:r>
+          </a:p>
+          <a:p>
+            <a:pPr marL="114300" indent="0">
+              <a:buNone/>
+            </a:pPr>
+            <a:r>
+              <a:rPr lang="en-US" sz="1400" dirty="0">
+                <a:latin typeface="Courier" charset="0"/>
+                <a:ea typeface="Courier" charset="0"/>
+                <a:cs typeface="Courier" charset="0"/>
+              </a:rPr>
+              <a:t>#SBATCH </a:t>
+            </a:r>
+            <a:r>
+              <a:rPr lang="en-US" sz="1400" dirty="0" smtClean="0">
+                <a:latin typeface="Courier" charset="0"/>
+                <a:ea typeface="Courier" charset="0"/>
+                <a:cs typeface="Courier" charset="0"/>
+              </a:rPr>
+              <a:t>--reservation=parallelD1 </a:t>
+            </a:r>
+            <a:r>
+              <a:rPr lang="en-US" sz="1400" dirty="0">
+                <a:latin typeface="Courier" charset="0"/>
+                <a:ea typeface="Courier" charset="0"/>
+                <a:cs typeface="Courier" charset="0"/>
+              </a:rPr>
+              <a:t>    # Specify </a:t>
+            </a:r>
+            <a:r>
+              <a:rPr lang="en-US" sz="1400" dirty="0" smtClean="0">
+                <a:latin typeface="Courier" charset="0"/>
+                <a:ea typeface="Courier" charset="0"/>
+                <a:cs typeface="Courier" charset="0"/>
+              </a:rPr>
+              <a:t>reservation</a:t>
+            </a:r>
+            <a:endParaRPr lang="en-US" sz="1400" dirty="0">
+              <a:latin typeface="Courier" charset="0"/>
+              <a:ea typeface="Courier" charset="0"/>
+              <a:cs typeface="Courier" charset="0"/>
+            </a:endParaRPr>
+          </a:p>
+          <a:p>
+            <a:pPr marL="114300" indent="0">
+              <a:buNone/>
+            </a:pPr>
+            <a:r>
+              <a:rPr lang="en-US" sz="1400" dirty="0">
+                <a:latin typeface="Courier" charset="0"/>
+                <a:ea typeface="Courier" charset="0"/>
+                <a:cs typeface="Courier" charset="0"/>
+              </a:rPr>
+              <a:t>#SBATCH --partition=</a:t>
+            </a:r>
+            <a:r>
+              <a:rPr lang="en-US" sz="1400" dirty="0" err="1">
+                <a:latin typeface="Courier" charset="0"/>
+                <a:ea typeface="Courier" charset="0"/>
+                <a:cs typeface="Courier" charset="0"/>
+              </a:rPr>
+              <a:t>shas</a:t>
+            </a:r>
+            <a:r>
+              <a:rPr lang="en-US" sz="1400" dirty="0">
+                <a:latin typeface="Courier" charset="0"/>
+                <a:ea typeface="Courier" charset="0"/>
+                <a:cs typeface="Courier" charset="0"/>
+              </a:rPr>
+              <a:t>             # Specify Summit </a:t>
+            </a:r>
+            <a:r>
+              <a:rPr lang="en-US" sz="1400" dirty="0" err="1">
+                <a:latin typeface="Courier" charset="0"/>
+                <a:ea typeface="Courier" charset="0"/>
+                <a:cs typeface="Courier" charset="0"/>
+              </a:rPr>
+              <a:t>haswell</a:t>
+            </a:r>
+            <a:r>
+              <a:rPr lang="en-US" sz="1400" dirty="0">
+                <a:latin typeface="Courier" charset="0"/>
+                <a:ea typeface="Courier" charset="0"/>
+                <a:cs typeface="Courier" charset="0"/>
+              </a:rPr>
+              <a:t> nodes</a:t>
+            </a:r>
+          </a:p>
+          <a:p>
+            <a:pPr marL="114300" indent="0">
+              <a:buNone/>
+            </a:pPr>
+            <a:r>
+              <a:rPr lang="en-US" sz="1400" dirty="0" smtClean="0">
+                <a:latin typeface="Courier" charset="0"/>
+                <a:ea typeface="Courier" charset="0"/>
+                <a:cs typeface="Courier" charset="0"/>
+              </a:rPr>
+              <a:t>#</a:t>
+            </a:r>
+            <a:r>
+              <a:rPr lang="en-US" sz="1400" dirty="0">
+                <a:latin typeface="Courier" charset="0"/>
+                <a:ea typeface="Courier" charset="0"/>
+                <a:cs typeface="Courier" charset="0"/>
+              </a:rPr>
+              <a:t>SBATCH --</a:t>
+            </a:r>
+            <a:r>
+              <a:rPr lang="en-US" sz="1400" dirty="0" smtClean="0">
+                <a:latin typeface="Courier" charset="0"/>
+                <a:ea typeface="Courier" charset="0"/>
+                <a:cs typeface="Courier" charset="0"/>
+              </a:rPr>
+              <a:t>job-name=</a:t>
+            </a:r>
+            <a:r>
+              <a:rPr lang="en-US" sz="1400" dirty="0" err="1" smtClean="0">
+                <a:latin typeface="Courier" charset="0"/>
+                <a:ea typeface="Courier" charset="0"/>
+                <a:cs typeface="Courier" charset="0"/>
+              </a:rPr>
+              <a:t>analyze_ex</a:t>
+            </a:r>
+            <a:r>
+              <a:rPr lang="en-US" sz="1400" dirty="0" err="1">
+                <a:latin typeface="Courier" charset="0"/>
+                <a:ea typeface="Courier" charset="0"/>
+                <a:cs typeface="Courier" charset="0"/>
+              </a:rPr>
+              <a:t>p</a:t>
+            </a:r>
+            <a:r>
+              <a:rPr lang="en-US" sz="1400" dirty="0" smtClean="0">
+                <a:latin typeface="Courier" charset="0"/>
+                <a:ea typeface="Courier" charset="0"/>
+                <a:cs typeface="Courier" charset="0"/>
+              </a:rPr>
+              <a:t> </a:t>
+            </a:r>
+            <a:r>
+              <a:rPr lang="en-US" sz="1400" dirty="0">
+                <a:latin typeface="Courier" charset="0"/>
+                <a:ea typeface="Courier" charset="0"/>
+                <a:cs typeface="Courier" charset="0"/>
+              </a:rPr>
+              <a:t>      # Job </a:t>
+            </a:r>
+            <a:r>
+              <a:rPr lang="en-US" sz="1400" dirty="0" smtClean="0">
+                <a:latin typeface="Courier" charset="0"/>
+                <a:ea typeface="Courier" charset="0"/>
+                <a:cs typeface="Courier" charset="0"/>
+              </a:rPr>
+              <a:t>name</a:t>
+            </a:r>
+            <a:endParaRPr lang="en-US" sz="1400" dirty="0">
+              <a:latin typeface="Courier" charset="0"/>
+              <a:ea typeface="Courier" charset="0"/>
+              <a:cs typeface="Courier" charset="0"/>
+            </a:endParaRPr>
+          </a:p>
+          <a:p>
+            <a:pPr marL="114300" indent="0">
+              <a:buNone/>
+            </a:pPr>
+            <a:r>
+              <a:rPr lang="en-US" sz="1400" dirty="0">
+                <a:latin typeface="Courier" charset="0"/>
+                <a:ea typeface="Courier" charset="0"/>
+                <a:cs typeface="Courier" charset="0"/>
+              </a:rPr>
+              <a:t>#SBATCH </a:t>
+            </a:r>
+            <a:r>
+              <a:rPr lang="en-US" sz="1400" dirty="0" smtClean="0">
+                <a:latin typeface="Courier" charset="0"/>
+                <a:ea typeface="Courier" charset="0"/>
+                <a:cs typeface="Courier" charset="0"/>
+              </a:rPr>
+              <a:t>--output=analyze.%A_%</a:t>
+            </a:r>
+            <a:r>
+              <a:rPr lang="en-US" sz="1400" dirty="0" err="1" smtClean="0">
+                <a:latin typeface="Courier" charset="0"/>
+                <a:ea typeface="Courier" charset="0"/>
+                <a:cs typeface="Courier" charset="0"/>
+              </a:rPr>
+              <a:t>a.out</a:t>
+            </a:r>
+            <a:r>
+              <a:rPr lang="en-US" sz="1400" dirty="0" smtClean="0">
+                <a:latin typeface="Courier" charset="0"/>
+                <a:ea typeface="Courier" charset="0"/>
+                <a:cs typeface="Courier" charset="0"/>
+              </a:rPr>
+              <a:t>  </a:t>
+            </a:r>
+            <a:r>
+              <a:rPr lang="en-US" sz="1400" dirty="0">
+                <a:latin typeface="Courier" charset="0"/>
+                <a:ea typeface="Courier" charset="0"/>
+                <a:cs typeface="Courier" charset="0"/>
+              </a:rPr>
+              <a:t> </a:t>
+            </a:r>
+            <a:r>
+              <a:rPr lang="en-US" sz="1400" dirty="0" smtClean="0">
+                <a:latin typeface="Courier" charset="0"/>
+                <a:ea typeface="Courier" charset="0"/>
+                <a:cs typeface="Courier" charset="0"/>
+              </a:rPr>
+              <a:t># </a:t>
+            </a:r>
+            <a:r>
+              <a:rPr lang="en-US" sz="1400" dirty="0">
+                <a:latin typeface="Courier" charset="0"/>
+                <a:ea typeface="Courier" charset="0"/>
+                <a:cs typeface="Courier" charset="0"/>
+              </a:rPr>
+              <a:t>Output file name with </a:t>
+            </a:r>
+            <a:r>
+              <a:rPr lang="en-US" sz="1400" dirty="0" smtClean="0">
+                <a:latin typeface="Courier" charset="0"/>
+                <a:ea typeface="Courier" charset="0"/>
+                <a:cs typeface="Courier" charset="0"/>
+              </a:rPr>
+              <a:t>Job/Task ID</a:t>
+            </a:r>
+            <a:r>
+              <a:rPr lang="en-US" sz="1400" dirty="0">
+                <a:latin typeface="Courier" charset="0"/>
+                <a:ea typeface="Courier" charset="0"/>
+                <a:cs typeface="Courier" charset="0"/>
+              </a:rPr>
+              <a:t> </a:t>
+            </a:r>
+          </a:p>
+          <a:p>
+            <a:pPr marL="114300" indent="0">
+              <a:buNone/>
+            </a:pPr>
+            <a:endParaRPr lang="en-US" sz="1400" dirty="0" smtClean="0">
+              <a:latin typeface="Courier" charset="0"/>
+              <a:ea typeface="Courier" charset="0"/>
+              <a:cs typeface="Courier" charset="0"/>
+            </a:endParaRPr>
+          </a:p>
+          <a:p>
+            <a:pPr marL="114300" indent="0">
+              <a:buNone/>
+            </a:pPr>
+            <a:r>
+              <a:rPr lang="en-US" sz="1400" dirty="0" smtClean="0">
+                <a:latin typeface="Courier" charset="0"/>
+                <a:ea typeface="Courier" charset="0"/>
+                <a:cs typeface="Courier" charset="0"/>
+              </a:rPr>
+              <a:t>cd /home/$USER/</a:t>
+            </a:r>
+            <a:r>
+              <a:rPr lang="en-US" sz="1400" dirty="0" err="1" smtClean="0">
+                <a:latin typeface="Courier" charset="0"/>
+                <a:ea typeface="Courier" charset="0"/>
+                <a:cs typeface="Courier" charset="0"/>
+              </a:rPr>
+              <a:t>Parallelization_Workshop</a:t>
+            </a:r>
+            <a:r>
+              <a:rPr lang="en-US" sz="1400" dirty="0" smtClean="0">
+                <a:latin typeface="Courier" charset="0"/>
+                <a:ea typeface="Courier" charset="0"/>
+                <a:cs typeface="Courier" charset="0"/>
+              </a:rPr>
+              <a:t>/Day1/</a:t>
+            </a:r>
+            <a:r>
+              <a:rPr lang="en-US" sz="1400" dirty="0" err="1" smtClean="0">
+                <a:latin typeface="Courier" charset="0"/>
+                <a:ea typeface="Courier" charset="0"/>
+                <a:cs typeface="Courier" charset="0"/>
+              </a:rPr>
+              <a:t>Slurm</a:t>
+            </a:r>
+            <a:endParaRPr lang="en-US" sz="1400" dirty="0" smtClean="0">
+              <a:latin typeface="Courier" charset="0"/>
+              <a:ea typeface="Courier" charset="0"/>
+              <a:cs typeface="Courier" charset="0"/>
+            </a:endParaRPr>
+          </a:p>
+          <a:p>
+            <a:pPr marL="114300" indent="0">
+              <a:buNone/>
+            </a:pPr>
+            <a:r>
+              <a:rPr lang="en-US" sz="1400" dirty="0">
+                <a:latin typeface="Courier" charset="0"/>
+                <a:ea typeface="Courier" charset="0"/>
+                <a:cs typeface="Courier" charset="0"/>
+              </a:rPr>
+              <a:t>m</a:t>
+            </a:r>
+            <a:r>
+              <a:rPr lang="en-US" sz="1400" dirty="0" smtClean="0">
+                <a:latin typeface="Courier" charset="0"/>
+                <a:ea typeface="Courier" charset="0"/>
+                <a:cs typeface="Courier" charset="0"/>
+              </a:rPr>
+              <a:t>odule purge</a:t>
+            </a:r>
+          </a:p>
+          <a:p>
+            <a:pPr marL="114300" indent="0">
+              <a:buNone/>
+            </a:pPr>
+            <a:r>
+              <a:rPr lang="en-US" sz="1400" dirty="0">
+                <a:latin typeface="Courier" charset="0"/>
+                <a:ea typeface="Courier" charset="0"/>
+                <a:cs typeface="Courier" charset="0"/>
+              </a:rPr>
+              <a:t>m</a:t>
+            </a:r>
+            <a:r>
+              <a:rPr lang="en-US" sz="1400" dirty="0" smtClean="0">
+                <a:latin typeface="Courier" charset="0"/>
+                <a:ea typeface="Courier" charset="0"/>
+                <a:cs typeface="Courier" charset="0"/>
+              </a:rPr>
+              <a:t>odule load intel/16.0.3</a:t>
+            </a:r>
+          </a:p>
+          <a:p>
+            <a:pPr marL="114300" indent="0">
+              <a:buNone/>
+            </a:pPr>
+            <a:r>
+              <a:rPr lang="en-US" sz="1400" dirty="0">
+                <a:latin typeface="Courier" charset="0"/>
+                <a:ea typeface="Courier" charset="0"/>
+                <a:cs typeface="Courier" charset="0"/>
+              </a:rPr>
+              <a:t>e</a:t>
+            </a:r>
+            <a:r>
+              <a:rPr lang="en-US" sz="1400" dirty="0" smtClean="0">
+                <a:latin typeface="Courier" charset="0"/>
+                <a:ea typeface="Courier" charset="0"/>
+                <a:cs typeface="Courier" charset="0"/>
+              </a:rPr>
+              <a:t>cho “I am Task ID: ” $SLURM_ARRAY_TASK_ID</a:t>
+            </a:r>
+          </a:p>
+          <a:p>
+            <a:pPr marL="114300" indent="0">
+              <a:buNone/>
+            </a:pPr>
+            <a:r>
+              <a:rPr lang="en-US" sz="1400" dirty="0" smtClean="0">
+                <a:latin typeface="Courier" charset="0"/>
+                <a:ea typeface="Courier" charset="0"/>
+                <a:cs typeface="Courier" charset="0"/>
+              </a:rPr>
+              <a:t>./</a:t>
+            </a:r>
+            <a:r>
+              <a:rPr lang="en-US" sz="1400" dirty="0" err="1" smtClean="0">
+                <a:latin typeface="Courier" charset="0"/>
+                <a:ea typeface="Courier" charset="0"/>
+                <a:cs typeface="Courier" charset="0"/>
+              </a:rPr>
+              <a:t>analyze.py</a:t>
+            </a:r>
+            <a:r>
+              <a:rPr lang="en-US" sz="1400" dirty="0" smtClean="0">
+                <a:latin typeface="Courier" charset="0"/>
+                <a:ea typeface="Courier" charset="0"/>
+                <a:cs typeface="Courier" charset="0"/>
+              </a:rPr>
+              <a:t> </a:t>
+            </a:r>
+            <a:r>
+              <a:rPr lang="en-US" sz="1400" dirty="0" err="1" smtClean="0">
+                <a:latin typeface="Courier" charset="0"/>
+                <a:ea typeface="Courier" charset="0"/>
+                <a:cs typeface="Courier" charset="0"/>
+              </a:rPr>
+              <a:t>exp_run.$SLURM_ARRAY_TASK_ID</a:t>
+            </a:r>
+            <a:r>
+              <a:rPr lang="en-US" sz="1400" dirty="0" smtClean="0">
+                <a:latin typeface="Courier" charset="0"/>
+                <a:ea typeface="Courier" charset="0"/>
+                <a:cs typeface="Courier" charset="0"/>
+              </a:rPr>
+              <a:t>  # One input file per Array Task</a:t>
+            </a:r>
+            <a:endParaRPr lang="en-US" sz="1400" dirty="0">
+              <a:latin typeface="Courier" charset="0"/>
+              <a:ea typeface="Courier" charset="0"/>
+              <a:cs typeface="Courier" charset="0"/>
+            </a:endParaRPr>
+          </a:p>
+          <a:p>
+            <a:endParaRPr lang="en-US" dirty="0"/>
+          </a:p>
+        </p:txBody>
+      </p:sp>
+      <p:sp>
+        <p:nvSpPr>
+          <p:cNvPr id="4" name="Date Placeholder 3"/>
+          <p:cNvSpPr>
+            <a:spLocks noGrp="1"/>
+          </p:cNvSpPr>
+          <p:nvPr>
+            <p:ph type="dt" sz="half" idx="10"/>
+          </p:nvPr>
+        </p:nvSpPr>
+        <p:spPr/>
+        <p:txBody>
+          <a:bodyPr/>
+          <a:lstStyle/>
+          <a:p>
+            <a:r>
+              <a:rPr lang="en-US" smtClean="0"/>
+              <a:t>5/15/17</a:t>
+            </a:r>
+            <a:endParaRPr lang="en-US"/>
+          </a:p>
+        </p:txBody>
+      </p:sp>
+      <p:sp>
+        <p:nvSpPr>
+          <p:cNvPr id="5" name="Footer Placeholder 4"/>
+          <p:cNvSpPr>
+            <a:spLocks noGrp="1"/>
+          </p:cNvSpPr>
+          <p:nvPr>
+            <p:ph type="ftr" sz="quarter" idx="11"/>
+          </p:nvPr>
+        </p:nvSpPr>
+        <p:spPr/>
+        <p:txBody>
+          <a:bodyPr/>
+          <a:lstStyle/>
+          <a:p>
+            <a:r>
+              <a:rPr lang="en-US" smtClean="0"/>
+              <a:t>Parallel workshop</a:t>
+            </a:r>
+            <a:endParaRPr lang="en-US"/>
+          </a:p>
+        </p:txBody>
+      </p:sp>
+      <p:sp>
+        <p:nvSpPr>
+          <p:cNvPr id="6" name="Slide Number Placeholder 5"/>
+          <p:cNvSpPr>
+            <a:spLocks noGrp="1"/>
+          </p:cNvSpPr>
+          <p:nvPr>
+            <p:ph type="sldNum" sz="quarter" idx="4"/>
+          </p:nvPr>
+        </p:nvSpPr>
+        <p:spPr/>
+        <p:txBody>
+          <a:bodyPr/>
+          <a:lstStyle/>
+          <a:p>
+            <a:fld id="{F81D5560-9D92-7847-90AE-DC1482349ABE}" type="slidenum">
+              <a:rPr lang="en-US" smtClean="0"/>
+              <a:t>24</a:t>
+            </a:fld>
+            <a:endParaRPr lang="en-US"/>
+          </a:p>
+        </p:txBody>
+      </p:sp>
+    </p:spTree>
+    <p:extLst>
+      <p:ext uri="{BB962C8B-B14F-4D97-AF65-F5344CB8AC3E}">
+        <p14:creationId xmlns:p14="http://schemas.microsoft.com/office/powerpoint/2010/main" val="830051165"/>
+      </p:ext>
+    </p:extLst>
+  </p:cSld>
+  <p:clrMapOvr>
+    <a:masterClrMapping/>
+  </p:clrMapOvr>
+  <p:timing>
+    <p:tnLst>
+      <p:par>
+        <p:cTn id="1" dur="indefinite" restart="never" nodeType="tmRoot"/>
+      </p:par>
+    </p:tnLst>
+  </p:timing>
+</p:sld>
+</file>
+
+<file path=ppt/slides/slide25.xml><?xml version="1.0" encoding="utf-8"?>
+<p:sld xmlns:a="http://schemas.openxmlformats.org/drawingml/2006/main" xmlns:r="http://schemas.openxmlformats.org/officeDocument/2006/relationships" xmlns:p="http://schemas.openxmlformats.org/presentationml/2006/main">
+  <p:cSld>
+    <p:spTree>
+      <p:nvGrpSpPr>
+        <p:cNvPr id="1" name=""/>
+        <p:cNvGrpSpPr/>
+        <p:nvPr/>
+      </p:nvGrpSpPr>
+      <p:grpSpPr>
+        <a:xfrm>
+          <a:off x="0" y="0"/>
+          <a:ext cx="0" cy="0"/>
+          <a:chOff x="0" y="0"/>
+          <a:chExt cx="0" cy="0"/>
+        </a:xfrm>
+      </p:grpSpPr>
+      <p:sp>
+        <p:nvSpPr>
+          <p:cNvPr id="2" name="Title 1"/>
+          <p:cNvSpPr>
+            <a:spLocks noGrp="1"/>
+          </p:cNvSpPr>
+          <p:nvPr>
+            <p:ph type="title"/>
+          </p:nvPr>
+        </p:nvSpPr>
+        <p:spPr/>
+        <p:txBody>
+          <a:bodyPr/>
+          <a:lstStyle/>
+          <a:p>
+            <a:r>
+              <a:rPr lang="en-US" dirty="0" smtClean="0">
+                <a:solidFill>
+                  <a:schemeClr val="tx2"/>
+                </a:solidFill>
+              </a:rPr>
+              <a:t>Job dependencies</a:t>
+            </a:r>
+            <a:endParaRPr lang="en-US" dirty="0">
+              <a:solidFill>
+                <a:schemeClr val="tx2"/>
+              </a:solidFill>
+            </a:endParaRPr>
+          </a:p>
+        </p:txBody>
+      </p:sp>
+      <p:sp>
+        <p:nvSpPr>
+          <p:cNvPr id="3" name="Content Placeholder 2"/>
+          <p:cNvSpPr>
+            <a:spLocks noGrp="1"/>
+          </p:cNvSpPr>
+          <p:nvPr>
+            <p:ph idx="1"/>
+          </p:nvPr>
+        </p:nvSpPr>
+        <p:spPr/>
+        <p:txBody>
+          <a:bodyPr vert="horz" lIns="91440" tIns="45720" rIns="91440" bIns="45720" rtlCol="0" anchor="t">
+            <a:normAutofit/>
+          </a:bodyPr>
+          <a:lstStyle/>
+          <a:p>
+            <a:r>
+              <a:rPr lang="en-US" dirty="0" smtClean="0"/>
+              <a:t>Allows you to build a sequential set of jobs, or “pipeline”</a:t>
+            </a:r>
+          </a:p>
+          <a:p>
+            <a:r>
+              <a:rPr lang="en-US" dirty="0" smtClean="0"/>
+              <a:t>Subsequent jobs won’t start until state of previous jobs meet certain conditions</a:t>
+            </a:r>
+          </a:p>
+          <a:p>
+            <a:endParaRPr lang="en-US" dirty="0"/>
+          </a:p>
+          <a:p>
+            <a:r>
+              <a:rPr lang="en-US" dirty="0" err="1">
+                <a:latin typeface="Courier" charset="0"/>
+                <a:ea typeface="Courier" charset="0"/>
+                <a:cs typeface="Courier" charset="0"/>
+              </a:rPr>
+              <a:t>s</a:t>
+            </a:r>
+            <a:r>
+              <a:rPr lang="en-US" dirty="0" err="1" smtClean="0">
+                <a:latin typeface="Courier" charset="0"/>
+                <a:ea typeface="Courier" charset="0"/>
+                <a:cs typeface="Courier" charset="0"/>
+              </a:rPr>
+              <a:t>batch</a:t>
+            </a:r>
+            <a:r>
+              <a:rPr lang="en-US" dirty="0" smtClean="0">
+                <a:latin typeface="Courier" charset="0"/>
+                <a:ea typeface="Courier" charset="0"/>
+                <a:cs typeface="Courier" charset="0"/>
+              </a:rPr>
+              <a:t> --dependency=</a:t>
+            </a:r>
+            <a:r>
+              <a:rPr lang="en-US" dirty="0" err="1" smtClean="0">
+                <a:latin typeface="Courier" charset="0"/>
+                <a:ea typeface="Courier" charset="0"/>
+                <a:cs typeface="Courier" charset="0"/>
+              </a:rPr>
+              <a:t>type:jobid</a:t>
+            </a:r>
+            <a:r>
+              <a:rPr lang="en-US" dirty="0" smtClean="0">
+                <a:latin typeface="Courier" charset="0"/>
+                <a:ea typeface="Courier" charset="0"/>
+                <a:cs typeface="Courier" charset="0"/>
+              </a:rPr>
+              <a:t>[:</a:t>
+            </a:r>
+            <a:r>
+              <a:rPr lang="en-US" dirty="0" err="1" smtClean="0">
+                <a:latin typeface="Courier" charset="0"/>
+                <a:ea typeface="Courier" charset="0"/>
+                <a:cs typeface="Courier" charset="0"/>
+              </a:rPr>
+              <a:t>jobid</a:t>
+            </a:r>
+            <a:r>
+              <a:rPr lang="en-US" dirty="0" smtClean="0">
+                <a:latin typeface="Courier" charset="0"/>
+                <a:ea typeface="Courier" charset="0"/>
+                <a:cs typeface="Courier" charset="0"/>
+              </a:rPr>
+              <a:t>]</a:t>
+            </a:r>
+          </a:p>
+          <a:p>
+            <a:endParaRPr lang="en-US" dirty="0"/>
+          </a:p>
+          <a:p>
+            <a:r>
+              <a:rPr lang="en-US" dirty="0" smtClean="0"/>
+              <a:t>Types include:</a:t>
+            </a:r>
+          </a:p>
+          <a:p>
+            <a:pPr marL="411480" lvl="1" indent="0">
+              <a:buNone/>
+            </a:pPr>
+            <a:r>
+              <a:rPr lang="en-US" dirty="0" err="1">
+                <a:latin typeface="Courier" charset="0"/>
+                <a:ea typeface="Courier" charset="0"/>
+                <a:cs typeface="Courier" charset="0"/>
+              </a:rPr>
+              <a:t>a</a:t>
+            </a:r>
+            <a:r>
+              <a:rPr lang="en-US" dirty="0" err="1" smtClean="0">
+                <a:latin typeface="Courier" charset="0"/>
+                <a:ea typeface="Courier" charset="0"/>
+                <a:cs typeface="Courier" charset="0"/>
+              </a:rPr>
+              <a:t>fter:jobid</a:t>
+            </a:r>
+            <a:r>
+              <a:rPr lang="en-US" dirty="0" smtClean="0">
+                <a:latin typeface="Courier" charset="0"/>
+                <a:ea typeface="Courier" charset="0"/>
+                <a:cs typeface="Courier" charset="0"/>
+              </a:rPr>
+              <a:t>[:</a:t>
+            </a:r>
+            <a:r>
+              <a:rPr lang="en-US" dirty="0" err="1" smtClean="0">
+                <a:latin typeface="Courier" charset="0"/>
+                <a:ea typeface="Courier" charset="0"/>
+                <a:cs typeface="Courier" charset="0"/>
+              </a:rPr>
+              <a:t>jobid</a:t>
+            </a:r>
+            <a:r>
+              <a:rPr lang="en-US" dirty="0" smtClean="0">
+                <a:latin typeface="Courier" charset="0"/>
+                <a:ea typeface="Courier" charset="0"/>
+                <a:cs typeface="Courier" charset="0"/>
+              </a:rPr>
+              <a:t>]   </a:t>
+            </a:r>
+            <a:r>
+              <a:rPr lang="en-US" dirty="0" smtClean="0"/>
+              <a:t>(starts after </a:t>
+            </a:r>
+            <a:r>
+              <a:rPr lang="en-US" dirty="0" err="1" smtClean="0"/>
+              <a:t>jobid</a:t>
+            </a:r>
+            <a:r>
+              <a:rPr lang="en-US" dirty="0" smtClean="0"/>
+              <a:t> has started)</a:t>
+            </a:r>
+          </a:p>
+          <a:p>
+            <a:pPr marL="411480" lvl="1" indent="0">
+              <a:buNone/>
+            </a:pPr>
+            <a:r>
+              <a:rPr lang="en-US" dirty="0" err="1">
+                <a:latin typeface="Courier" charset="0"/>
+                <a:ea typeface="Courier" charset="0"/>
+                <a:cs typeface="Courier" charset="0"/>
+              </a:rPr>
+              <a:t>a</a:t>
+            </a:r>
+            <a:r>
+              <a:rPr lang="en-US" dirty="0" err="1" smtClean="0">
+                <a:latin typeface="Courier" charset="0"/>
+                <a:ea typeface="Courier" charset="0"/>
+                <a:cs typeface="Courier" charset="0"/>
+              </a:rPr>
+              <a:t>fterok:jobid</a:t>
+            </a:r>
+            <a:r>
+              <a:rPr lang="en-US" dirty="0" smtClean="0">
+                <a:latin typeface="Courier" charset="0"/>
+                <a:ea typeface="Courier" charset="0"/>
+                <a:cs typeface="Courier" charset="0"/>
+              </a:rPr>
+              <a:t>[:</a:t>
+            </a:r>
+            <a:r>
+              <a:rPr lang="en-US" dirty="0" err="1" smtClean="0">
+                <a:latin typeface="Courier" charset="0"/>
+                <a:ea typeface="Courier" charset="0"/>
+                <a:cs typeface="Courier" charset="0"/>
+              </a:rPr>
+              <a:t>jobid</a:t>
+            </a:r>
+            <a:r>
+              <a:rPr lang="en-US" dirty="0" smtClean="0">
+                <a:latin typeface="Courier" charset="0"/>
+                <a:ea typeface="Courier" charset="0"/>
+                <a:cs typeface="Courier" charset="0"/>
+              </a:rPr>
+              <a:t>] </a:t>
+            </a:r>
+            <a:r>
+              <a:rPr lang="en-US" dirty="0" smtClean="0"/>
+              <a:t>(starts after </a:t>
+            </a:r>
+            <a:r>
+              <a:rPr lang="en-US" dirty="0" err="1" smtClean="0"/>
+              <a:t>jobid</a:t>
+            </a:r>
+            <a:r>
+              <a:rPr lang="en-US" dirty="0" smtClean="0"/>
+              <a:t> finishes ok)</a:t>
+            </a:r>
+          </a:p>
+          <a:p>
+            <a:pPr marL="411480" lvl="1" indent="0">
+              <a:buNone/>
+            </a:pPr>
+            <a:r>
+              <a:rPr lang="en-US" dirty="0">
+                <a:latin typeface="Courier" charset="0"/>
+                <a:ea typeface="Courier" charset="0"/>
+                <a:cs typeface="Courier" charset="0"/>
+              </a:rPr>
+              <a:t>s</a:t>
+            </a:r>
+            <a:r>
+              <a:rPr lang="en-US" dirty="0" smtClean="0">
+                <a:latin typeface="Courier" charset="0"/>
+                <a:ea typeface="Courier" charset="0"/>
+                <a:cs typeface="Courier" charset="0"/>
+              </a:rPr>
+              <a:t>ingleton</a:t>
+            </a:r>
+            <a:r>
+              <a:rPr lang="en-US" dirty="0" smtClean="0"/>
+              <a:t>                            (starts after all previous jobs </a:t>
+            </a:r>
+          </a:p>
+          <a:p>
+            <a:pPr marL="411480" lvl="1" indent="0">
+              <a:buNone/>
+            </a:pPr>
+            <a:r>
+              <a:rPr lang="en-US" dirty="0"/>
+              <a:t> </a:t>
+            </a:r>
+            <a:r>
+              <a:rPr lang="en-US" dirty="0" smtClean="0"/>
+              <a:t>                        </a:t>
+            </a:r>
+            <a:r>
+              <a:rPr lang="en-US" dirty="0" smtClean="0"/>
+              <a:t>with the same name and user have ended)</a:t>
+            </a:r>
+            <a:endParaRPr lang="en-US" dirty="0"/>
+          </a:p>
+          <a:p>
+            <a:endParaRPr lang="en-US" dirty="0"/>
+          </a:p>
+        </p:txBody>
+      </p:sp>
+      <p:sp>
+        <p:nvSpPr>
+          <p:cNvPr id="4" name="Date Placeholder 3"/>
+          <p:cNvSpPr>
+            <a:spLocks noGrp="1"/>
+          </p:cNvSpPr>
+          <p:nvPr>
+            <p:ph type="dt" sz="half" idx="10"/>
+          </p:nvPr>
+        </p:nvSpPr>
+        <p:spPr/>
+        <p:txBody>
+          <a:bodyPr/>
+          <a:lstStyle/>
+          <a:p>
+            <a:r>
+              <a:rPr lang="en-US" smtClean="0"/>
+              <a:t>5/15/17</a:t>
+            </a:r>
+            <a:endParaRPr lang="en-US"/>
+          </a:p>
+        </p:txBody>
+      </p:sp>
+      <p:sp>
+        <p:nvSpPr>
+          <p:cNvPr id="5" name="Footer Placeholder 4"/>
+          <p:cNvSpPr>
+            <a:spLocks noGrp="1"/>
+          </p:cNvSpPr>
+          <p:nvPr>
+            <p:ph type="ftr" sz="quarter" idx="11"/>
+          </p:nvPr>
+        </p:nvSpPr>
+        <p:spPr/>
+        <p:txBody>
+          <a:bodyPr/>
+          <a:lstStyle/>
+          <a:p>
+            <a:r>
+              <a:rPr lang="en-US" smtClean="0"/>
+              <a:t>Parallel workshop</a:t>
+            </a:r>
+            <a:endParaRPr lang="en-US"/>
+          </a:p>
+        </p:txBody>
+      </p:sp>
+      <p:sp>
+        <p:nvSpPr>
+          <p:cNvPr id="6" name="Slide Number Placeholder 5"/>
+          <p:cNvSpPr>
+            <a:spLocks noGrp="1"/>
+          </p:cNvSpPr>
+          <p:nvPr>
+            <p:ph type="sldNum" sz="quarter" idx="4"/>
+          </p:nvPr>
+        </p:nvSpPr>
+        <p:spPr/>
+        <p:txBody>
+          <a:bodyPr/>
+          <a:lstStyle/>
+          <a:p>
+            <a:fld id="{F81D5560-9D92-7847-90AE-DC1482349ABE}" type="slidenum">
+              <a:rPr lang="en-US" smtClean="0"/>
+              <a:t>25</a:t>
+            </a:fld>
+            <a:endParaRPr lang="en-US"/>
+          </a:p>
+        </p:txBody>
+      </p:sp>
+    </p:spTree>
+    <p:extLst>
+      <p:ext uri="{BB962C8B-B14F-4D97-AF65-F5344CB8AC3E}">
+        <p14:creationId xmlns:p14="http://schemas.microsoft.com/office/powerpoint/2010/main" val="449748163"/>
+      </p:ext>
+    </p:extLst>
+  </p:cSld>
+  <p:clrMapOvr>
+    <a:masterClrMapping/>
+  </p:clrMapOvr>
+  <p:timing>
+    <p:tnLst>
+      <p:par>
+        <p:cTn id="1" dur="indefinite" restart="never" nodeType="tmRoot"/>
+      </p:par>
+    </p:tnLst>
+  </p:timing>
+</p:sld>
+</file>
+
+<file path=ppt/slides/slide26.xml><?xml version="1.0" encoding="utf-8"?>
+<p:sld xmlns:a="http://schemas.openxmlformats.org/drawingml/2006/main" xmlns:r="http://schemas.openxmlformats.org/officeDocument/2006/relationships" xmlns:p="http://schemas.openxmlformats.org/presentationml/2006/main">
+  <p:cSld>
+    <p:spTree>
+      <p:nvGrpSpPr>
+        <p:cNvPr id="1" name=""/>
+        <p:cNvGrpSpPr/>
+        <p:nvPr/>
+      </p:nvGrpSpPr>
+      <p:grpSpPr>
+        <a:xfrm>
+          <a:off x="0" y="0"/>
+          <a:ext cx="0" cy="0"/>
+          <a:chOff x="0" y="0"/>
+          <a:chExt cx="0" cy="0"/>
+        </a:xfrm>
+      </p:grpSpPr>
+      <p:sp>
+        <p:nvSpPr>
+          <p:cNvPr id="2" name="Title 1"/>
+          <p:cNvSpPr>
+            <a:spLocks noGrp="1"/>
+          </p:cNvSpPr>
+          <p:nvPr>
+            <p:ph type="title"/>
+          </p:nvPr>
+        </p:nvSpPr>
+        <p:spPr/>
+        <p:txBody>
+          <a:bodyPr/>
+          <a:lstStyle/>
+          <a:p>
+            <a:r>
+              <a:rPr lang="en-US" dirty="0" smtClean="0">
+                <a:solidFill>
+                  <a:schemeClr val="tx2"/>
+                </a:solidFill>
+              </a:rPr>
+              <a:t>Job dependency example</a:t>
+            </a:r>
+            <a:endParaRPr lang="en-US" dirty="0">
+              <a:solidFill>
+                <a:schemeClr val="tx2"/>
+              </a:solidFill>
+            </a:endParaRPr>
+          </a:p>
+        </p:txBody>
+      </p:sp>
+      <p:sp>
+        <p:nvSpPr>
+          <p:cNvPr id="3" name="Content Placeholder 2"/>
+          <p:cNvSpPr>
+            <a:spLocks noGrp="1"/>
+          </p:cNvSpPr>
+          <p:nvPr>
+            <p:ph idx="1"/>
+          </p:nvPr>
+        </p:nvSpPr>
+        <p:spPr/>
+        <p:txBody>
+          <a:bodyPr vert="horz" lIns="91440" tIns="45720" rIns="91440" bIns="45720" rtlCol="0" anchor="t">
+            <a:normAutofit/>
+          </a:bodyPr>
+          <a:lstStyle/>
+          <a:p>
+            <a:r>
+              <a:rPr lang="en-US" dirty="0" smtClean="0"/>
+              <a:t>Submit one job, note its </a:t>
+            </a:r>
+            <a:r>
+              <a:rPr lang="en-US" dirty="0" err="1" smtClean="0"/>
+              <a:t>JobID</a:t>
+            </a:r>
+            <a:r>
+              <a:rPr lang="en-US" dirty="0" smtClean="0"/>
+              <a:t>, then submit subsequent jobs with dependency on that </a:t>
+            </a:r>
+            <a:r>
+              <a:rPr lang="en-US" dirty="0" err="1" smtClean="0"/>
+              <a:t>JobID</a:t>
+            </a:r>
+            <a:endParaRPr lang="en-US" dirty="0" smtClean="0"/>
+          </a:p>
+          <a:p>
+            <a:endParaRPr lang="en-US" dirty="0"/>
+          </a:p>
+          <a:p>
+            <a:pPr marL="114300" indent="0">
+              <a:buNone/>
+            </a:pPr>
+            <a:r>
+              <a:rPr lang="en-US" dirty="0" smtClean="0">
+                <a:latin typeface="Courier" charset="0"/>
+                <a:ea typeface="Courier" charset="0"/>
+                <a:cs typeface="Courier" charset="0"/>
+              </a:rPr>
+              <a:t>$ </a:t>
+            </a:r>
+            <a:r>
+              <a:rPr lang="en-US" dirty="0" err="1" smtClean="0">
+                <a:latin typeface="Courier" charset="0"/>
+                <a:ea typeface="Courier" charset="0"/>
+                <a:cs typeface="Courier" charset="0"/>
+              </a:rPr>
+              <a:t>sbatch</a:t>
+            </a:r>
+            <a:r>
+              <a:rPr lang="en-US" dirty="0" smtClean="0">
+                <a:latin typeface="Courier" charset="0"/>
+                <a:ea typeface="Courier" charset="0"/>
+                <a:cs typeface="Courier" charset="0"/>
+              </a:rPr>
+              <a:t> job1.sh</a:t>
+            </a:r>
+          </a:p>
+          <a:p>
+            <a:pPr marL="114300" indent="0">
+              <a:buNone/>
+            </a:pPr>
+            <a:r>
+              <a:rPr lang="en-US" dirty="0" smtClean="0">
+                <a:latin typeface="Courier" charset="0"/>
+                <a:ea typeface="Courier" charset="0"/>
+                <a:cs typeface="Courier" charset="0"/>
+              </a:rPr>
+              <a:t>87732</a:t>
+            </a:r>
+          </a:p>
+          <a:p>
+            <a:pPr marL="114300" indent="0">
+              <a:buNone/>
+            </a:pPr>
+            <a:r>
+              <a:rPr lang="en-US" dirty="0" smtClean="0">
+                <a:latin typeface="Courier" charset="0"/>
+                <a:ea typeface="Courier" charset="0"/>
+                <a:cs typeface="Courier" charset="0"/>
+              </a:rPr>
+              <a:t>$ </a:t>
+            </a:r>
+            <a:r>
+              <a:rPr lang="en-US" dirty="0" err="1" smtClean="0">
+                <a:latin typeface="Courier" charset="0"/>
+                <a:ea typeface="Courier" charset="0"/>
+                <a:cs typeface="Courier" charset="0"/>
+              </a:rPr>
+              <a:t>sbatch</a:t>
+            </a:r>
+            <a:r>
+              <a:rPr lang="en-US" dirty="0" smtClean="0">
+                <a:latin typeface="Courier" charset="0"/>
+                <a:ea typeface="Courier" charset="0"/>
+                <a:cs typeface="Courier" charset="0"/>
+              </a:rPr>
+              <a:t> --dependency=afterok:87732 job2.sh</a:t>
+            </a:r>
+          </a:p>
+          <a:p>
+            <a:pPr marL="114300" indent="0">
+              <a:buNone/>
+            </a:pPr>
+            <a:r>
+              <a:rPr lang="en-US" dirty="0" smtClean="0">
+                <a:latin typeface="Courier" charset="0"/>
+                <a:ea typeface="Courier" charset="0"/>
+                <a:cs typeface="Courier" charset="0"/>
+              </a:rPr>
+              <a:t>87733</a:t>
+            </a:r>
+          </a:p>
+          <a:p>
+            <a:pPr marL="114300" indent="0">
+              <a:buNone/>
+            </a:pPr>
+            <a:r>
+              <a:rPr lang="en-US" dirty="0" smtClean="0">
+                <a:latin typeface="Courier" charset="0"/>
+                <a:ea typeface="Courier" charset="0"/>
+                <a:cs typeface="Courier" charset="0"/>
+              </a:rPr>
+              <a:t>$ </a:t>
+            </a:r>
+            <a:r>
+              <a:rPr lang="en-US" dirty="0" err="1" smtClean="0">
+                <a:latin typeface="Courier" charset="0"/>
+                <a:ea typeface="Courier" charset="0"/>
+                <a:cs typeface="Courier" charset="0"/>
+              </a:rPr>
+              <a:t>sbatch</a:t>
+            </a:r>
+            <a:r>
+              <a:rPr lang="en-US" dirty="0" smtClean="0">
+                <a:latin typeface="Courier" charset="0"/>
+                <a:ea typeface="Courier" charset="0"/>
+                <a:cs typeface="Courier" charset="0"/>
+              </a:rPr>
+              <a:t> </a:t>
+            </a:r>
+            <a:r>
+              <a:rPr lang="en-US" dirty="0">
+                <a:latin typeface="Courier" charset="0"/>
+                <a:ea typeface="Courier" charset="0"/>
+                <a:cs typeface="Courier" charset="0"/>
+              </a:rPr>
+              <a:t>--</a:t>
+            </a:r>
+            <a:r>
+              <a:rPr lang="en-US" dirty="0" smtClean="0">
+                <a:latin typeface="Courier" charset="0"/>
+                <a:ea typeface="Courier" charset="0"/>
+                <a:cs typeface="Courier" charset="0"/>
+              </a:rPr>
+              <a:t>dependency=afterok:87733 job3.sh</a:t>
+            </a:r>
+          </a:p>
+          <a:p>
+            <a:pPr marL="114300" indent="0">
+              <a:buNone/>
+            </a:pPr>
+            <a:r>
+              <a:rPr lang="en-US" dirty="0" smtClean="0">
+                <a:latin typeface="Courier" charset="0"/>
+                <a:ea typeface="Courier" charset="0"/>
+                <a:cs typeface="Courier" charset="0"/>
+              </a:rPr>
+              <a:t>87734</a:t>
+            </a:r>
+            <a:endParaRPr lang="en-US" dirty="0">
+              <a:latin typeface="Courier" charset="0"/>
+              <a:ea typeface="Courier" charset="0"/>
+              <a:cs typeface="Courier" charset="0"/>
+            </a:endParaRPr>
+          </a:p>
+          <a:p>
+            <a:endParaRPr lang="en-US" dirty="0" smtClean="0">
+              <a:latin typeface="Courier" charset="0"/>
+              <a:ea typeface="Courier" charset="0"/>
+              <a:cs typeface="Courier" charset="0"/>
+            </a:endParaRPr>
+          </a:p>
+          <a:p>
+            <a:endParaRPr lang="en-US" dirty="0"/>
+          </a:p>
+          <a:p>
+            <a:endParaRPr lang="en-US" dirty="0"/>
+          </a:p>
+        </p:txBody>
+      </p:sp>
+      <p:sp>
+        <p:nvSpPr>
+          <p:cNvPr id="4" name="Date Placeholder 3"/>
+          <p:cNvSpPr>
+            <a:spLocks noGrp="1"/>
+          </p:cNvSpPr>
+          <p:nvPr>
+            <p:ph type="dt" sz="half" idx="10"/>
+          </p:nvPr>
+        </p:nvSpPr>
+        <p:spPr/>
+        <p:txBody>
+          <a:bodyPr/>
+          <a:lstStyle/>
+          <a:p>
+            <a:r>
+              <a:rPr lang="en-US" smtClean="0"/>
+              <a:t>5/15/17</a:t>
+            </a:r>
+            <a:endParaRPr lang="en-US"/>
+          </a:p>
+        </p:txBody>
+      </p:sp>
+      <p:sp>
+        <p:nvSpPr>
+          <p:cNvPr id="5" name="Footer Placeholder 4"/>
+          <p:cNvSpPr>
+            <a:spLocks noGrp="1"/>
+          </p:cNvSpPr>
+          <p:nvPr>
+            <p:ph type="ftr" sz="quarter" idx="11"/>
+          </p:nvPr>
+        </p:nvSpPr>
+        <p:spPr/>
+        <p:txBody>
+          <a:bodyPr/>
+          <a:lstStyle/>
+          <a:p>
+            <a:r>
+              <a:rPr lang="en-US" smtClean="0"/>
+              <a:t>Parallel workshop</a:t>
+            </a:r>
+            <a:endParaRPr lang="en-US"/>
+          </a:p>
+        </p:txBody>
+      </p:sp>
+      <p:sp>
+        <p:nvSpPr>
+          <p:cNvPr id="6" name="Slide Number Placeholder 5"/>
+          <p:cNvSpPr>
+            <a:spLocks noGrp="1"/>
+          </p:cNvSpPr>
+          <p:nvPr>
+            <p:ph type="sldNum" sz="quarter" idx="4"/>
+          </p:nvPr>
+        </p:nvSpPr>
+        <p:spPr/>
+        <p:txBody>
+          <a:bodyPr/>
+          <a:lstStyle/>
+          <a:p>
+            <a:fld id="{F81D5560-9D92-7847-90AE-DC1482349ABE}" type="slidenum">
+              <a:rPr lang="en-US" smtClean="0"/>
+              <a:t>26</a:t>
+            </a:fld>
+            <a:endParaRPr lang="en-US"/>
+          </a:p>
+        </p:txBody>
+      </p:sp>
+    </p:spTree>
+    <p:extLst>
+      <p:ext uri="{BB962C8B-B14F-4D97-AF65-F5344CB8AC3E}">
+        <p14:creationId xmlns:p14="http://schemas.microsoft.com/office/powerpoint/2010/main" val="2020050862"/>
+      </p:ext>
+    </p:extLst>
+  </p:cSld>
+  <p:clrMapOvr>
+    <a:masterClrMapping/>
+  </p:clrMapOvr>
+  <p:timing>
+    <p:tnLst>
+      <p:par>
+        <p:cTn id="1" dur="indefinite" restart="never" nodeType="tmRoot"/>
+      </p:par>
+    </p:tnLst>
+  </p:timing>
+</p:sld>
+</file>
+
+<file path=ppt/slides/slide27.xml><?xml version="1.0" encoding="utf-8"?>
+<p:sld xmlns:a="http://schemas.openxmlformats.org/drawingml/2006/main" xmlns:r="http://schemas.openxmlformats.org/officeDocument/2006/relationships" xmlns:p="http://schemas.openxmlformats.org/presentationml/2006/main">
+  <p:cSld>
+    <p:spTree>
+      <p:nvGrpSpPr>
+        <p:cNvPr id="1" name=""/>
+        <p:cNvGrpSpPr/>
+        <p:nvPr/>
+      </p:nvGrpSpPr>
+      <p:grpSpPr>
+        <a:xfrm>
+          <a:off x="0" y="0"/>
+          <a:ext cx="0" cy="0"/>
+          <a:chOff x="0" y="0"/>
+          <a:chExt cx="0" cy="0"/>
+        </a:xfrm>
+      </p:grpSpPr>
+      <p:sp>
+        <p:nvSpPr>
+          <p:cNvPr id="2" name="Title 1"/>
+          <p:cNvSpPr>
+            <a:spLocks noGrp="1"/>
+          </p:cNvSpPr>
+          <p:nvPr>
+            <p:ph type="title"/>
+          </p:nvPr>
+        </p:nvSpPr>
+        <p:spPr/>
+        <p:txBody>
+          <a:bodyPr/>
+          <a:lstStyle/>
+          <a:p>
+            <a:r>
+              <a:rPr lang="en-US" dirty="0" smtClean="0">
+                <a:solidFill>
+                  <a:schemeClr val="tx2"/>
+                </a:solidFill>
+              </a:rPr>
+              <a:t>Job dependency </a:t>
+            </a:r>
+            <a:r>
+              <a:rPr lang="mr-IN" dirty="0" smtClean="0">
+                <a:solidFill>
+                  <a:schemeClr val="tx2"/>
+                </a:solidFill>
+              </a:rPr>
+              <a:t>–</a:t>
+            </a:r>
+            <a:r>
+              <a:rPr lang="en-US" dirty="0" smtClean="0">
+                <a:solidFill>
+                  <a:schemeClr val="tx2"/>
+                </a:solidFill>
+              </a:rPr>
+              <a:t> job script</a:t>
+            </a:r>
+            <a:endParaRPr lang="en-US" dirty="0">
+              <a:solidFill>
+                <a:schemeClr val="tx2"/>
+              </a:solidFill>
+            </a:endParaRPr>
+          </a:p>
+        </p:txBody>
+      </p:sp>
+      <p:sp>
+        <p:nvSpPr>
+          <p:cNvPr id="3" name="Content Placeholder 2"/>
+          <p:cNvSpPr>
+            <a:spLocks noGrp="1"/>
+          </p:cNvSpPr>
+          <p:nvPr>
+            <p:ph idx="1"/>
+          </p:nvPr>
+        </p:nvSpPr>
+        <p:spPr/>
+        <p:txBody>
+          <a:bodyPr vert="horz" lIns="91440" tIns="45720" rIns="91440" bIns="45720" rtlCol="0" anchor="t">
+            <a:normAutofit/>
+          </a:bodyPr>
+          <a:lstStyle/>
+          <a:p>
+            <a:pPr marL="114300" indent="0">
+              <a:buNone/>
+            </a:pPr>
+            <a:r>
+              <a:rPr lang="en-US" sz="1400" dirty="0">
+                <a:latin typeface="Courier" charset="0"/>
+                <a:ea typeface="Courier" charset="0"/>
+                <a:cs typeface="Courier" charset="0"/>
+              </a:rPr>
+              <a:t>#!/</a:t>
+            </a:r>
+            <a:r>
+              <a:rPr lang="en-US" sz="1400" dirty="0" smtClean="0">
+                <a:latin typeface="Courier" charset="0"/>
+                <a:ea typeface="Courier" charset="0"/>
+                <a:cs typeface="Courier" charset="0"/>
+              </a:rPr>
+              <a:t>bin/bash</a:t>
+            </a:r>
+          </a:p>
+          <a:p>
+            <a:pPr marL="114300" indent="0">
+              <a:buNone/>
+            </a:pPr>
+            <a:r>
+              <a:rPr lang="en-US" sz="1400" dirty="0">
+                <a:latin typeface="Courier" charset="0"/>
+                <a:ea typeface="Courier" charset="0"/>
+                <a:cs typeface="Courier" charset="0"/>
+              </a:rPr>
+              <a:t>#SBATCH --</a:t>
+            </a:r>
+            <a:r>
+              <a:rPr lang="en-US" sz="1400" dirty="0" smtClean="0">
+                <a:latin typeface="Courier" charset="0"/>
+                <a:ea typeface="Courier" charset="0"/>
+                <a:cs typeface="Courier" charset="0"/>
+              </a:rPr>
+              <a:t>nodes=1</a:t>
+            </a:r>
+            <a:r>
+              <a:rPr lang="en-US" sz="1400" dirty="0">
+                <a:latin typeface="Courier" charset="0"/>
+                <a:ea typeface="Courier" charset="0"/>
+                <a:cs typeface="Courier" charset="0"/>
+              </a:rPr>
+              <a:t>            </a:t>
+            </a:r>
+            <a:r>
+              <a:rPr lang="en-US" sz="1400" dirty="0" smtClean="0">
+                <a:latin typeface="Courier" charset="0"/>
+                <a:ea typeface="Courier" charset="0"/>
+                <a:cs typeface="Courier" charset="0"/>
+              </a:rPr>
+              <a:t># </a:t>
+            </a:r>
+            <a:r>
+              <a:rPr lang="en-US" sz="1400" dirty="0">
+                <a:latin typeface="Courier" charset="0"/>
+                <a:ea typeface="Courier" charset="0"/>
+                <a:cs typeface="Courier" charset="0"/>
+              </a:rPr>
+              <a:t>Number of requested </a:t>
+            </a:r>
+            <a:r>
+              <a:rPr lang="en-US" sz="1400" dirty="0" smtClean="0">
+                <a:latin typeface="Courier" charset="0"/>
+                <a:ea typeface="Courier" charset="0"/>
+                <a:cs typeface="Courier" charset="0"/>
+              </a:rPr>
+              <a:t>nodes</a:t>
+            </a:r>
+          </a:p>
+          <a:p>
+            <a:pPr marL="114300" indent="0">
+              <a:buNone/>
+            </a:pPr>
+            <a:r>
+              <a:rPr lang="en-US" sz="1400" dirty="0">
+                <a:latin typeface="Courier" charset="0"/>
+                <a:ea typeface="Courier" charset="0"/>
+                <a:cs typeface="Courier" charset="0"/>
+              </a:rPr>
+              <a:t>#SBATCH --</a:t>
+            </a:r>
+            <a:r>
+              <a:rPr lang="en-US" sz="1400" dirty="0" err="1" smtClean="0">
+                <a:latin typeface="Courier" charset="0"/>
+                <a:ea typeface="Courier" charset="0"/>
+                <a:cs typeface="Courier" charset="0"/>
+              </a:rPr>
+              <a:t>ntasks</a:t>
+            </a:r>
+            <a:r>
+              <a:rPr lang="en-US" sz="1400" dirty="0" smtClean="0">
+                <a:latin typeface="Courier" charset="0"/>
+                <a:ea typeface="Courier" charset="0"/>
+                <a:cs typeface="Courier" charset="0"/>
+              </a:rPr>
+              <a:t>=1   </a:t>
+            </a:r>
+            <a:r>
+              <a:rPr lang="en-US" sz="1400" dirty="0">
+                <a:latin typeface="Courier" charset="0"/>
+                <a:ea typeface="Courier" charset="0"/>
+                <a:cs typeface="Courier" charset="0"/>
+              </a:rPr>
+              <a:t>   </a:t>
+            </a:r>
+            <a:r>
+              <a:rPr lang="en-US" sz="1400" dirty="0" smtClean="0">
+                <a:latin typeface="Courier" charset="0"/>
+                <a:ea typeface="Courier" charset="0"/>
+                <a:cs typeface="Courier" charset="0"/>
+              </a:rPr>
+              <a:t> </a:t>
+            </a:r>
+            <a:r>
+              <a:rPr lang="en-US" sz="1400" dirty="0">
+                <a:latin typeface="Courier" charset="0"/>
+                <a:ea typeface="Courier" charset="0"/>
+                <a:cs typeface="Courier" charset="0"/>
+              </a:rPr>
+              <a:t>  </a:t>
+            </a:r>
+            <a:r>
+              <a:rPr lang="en-US" sz="1400" dirty="0" smtClean="0">
+                <a:latin typeface="Courier" charset="0"/>
+                <a:ea typeface="Courier" charset="0"/>
+                <a:cs typeface="Courier" charset="0"/>
+              </a:rPr>
+              <a:t> </a:t>
+            </a:r>
+            <a:r>
+              <a:rPr lang="en-US" sz="1400" dirty="0">
+                <a:latin typeface="Courier" charset="0"/>
+                <a:ea typeface="Courier" charset="0"/>
+                <a:cs typeface="Courier" charset="0"/>
+              </a:rPr>
+              <a:t> # Number of tasks per </a:t>
+            </a:r>
+            <a:r>
+              <a:rPr lang="en-US" sz="1400" dirty="0" smtClean="0">
+                <a:latin typeface="Courier" charset="0"/>
+                <a:ea typeface="Courier" charset="0"/>
+                <a:cs typeface="Courier" charset="0"/>
+              </a:rPr>
+              <a:t>job; </a:t>
+            </a:r>
+            <a:r>
+              <a:rPr lang="en-US" sz="1400" dirty="0" err="1" smtClean="0">
+                <a:latin typeface="Courier" charset="0"/>
+                <a:ea typeface="Courier" charset="0"/>
+                <a:cs typeface="Courier" charset="0"/>
+              </a:rPr>
+              <a:t>ie</a:t>
+            </a:r>
+            <a:r>
+              <a:rPr lang="en-US" sz="1400" dirty="0" smtClean="0">
+                <a:latin typeface="Courier" charset="0"/>
+                <a:ea typeface="Courier" charset="0"/>
+                <a:cs typeface="Courier" charset="0"/>
+              </a:rPr>
+              <a:t> number of cores</a:t>
+            </a:r>
+            <a:endParaRPr lang="en-US" sz="1400" dirty="0">
+              <a:latin typeface="Courier" charset="0"/>
+              <a:ea typeface="Courier" charset="0"/>
+              <a:cs typeface="Courier" charset="0"/>
+            </a:endParaRPr>
+          </a:p>
+          <a:p>
+            <a:pPr marL="114300" indent="0">
+              <a:buNone/>
+            </a:pPr>
+            <a:r>
+              <a:rPr lang="en-US" sz="1400" dirty="0" smtClean="0">
+                <a:latin typeface="Courier" charset="0"/>
+                <a:ea typeface="Courier" charset="0"/>
+                <a:cs typeface="Courier" charset="0"/>
+              </a:rPr>
+              <a:t>#</a:t>
+            </a:r>
+            <a:r>
+              <a:rPr lang="en-US" sz="1400" dirty="0">
+                <a:latin typeface="Courier" charset="0"/>
+                <a:ea typeface="Courier" charset="0"/>
+                <a:cs typeface="Courier" charset="0"/>
+              </a:rPr>
+              <a:t>SBATCH --</a:t>
+            </a:r>
+            <a:r>
+              <a:rPr lang="en-US" sz="1400" dirty="0" smtClean="0">
+                <a:latin typeface="Courier" charset="0"/>
+                <a:ea typeface="Courier" charset="0"/>
+                <a:cs typeface="Courier" charset="0"/>
+              </a:rPr>
+              <a:t>time=0:02:00 </a:t>
+            </a:r>
+            <a:r>
+              <a:rPr lang="en-US" sz="1400" dirty="0">
+                <a:latin typeface="Courier" charset="0"/>
+                <a:ea typeface="Courier" charset="0"/>
+                <a:cs typeface="Courier" charset="0"/>
+              </a:rPr>
+              <a:t>              # Max wall time</a:t>
+            </a:r>
+          </a:p>
+          <a:p>
+            <a:pPr marL="114300" indent="0">
+              <a:buNone/>
+            </a:pPr>
+            <a:r>
+              <a:rPr lang="en-US" sz="1400" dirty="0">
+                <a:latin typeface="Courier" charset="0"/>
+                <a:ea typeface="Courier" charset="0"/>
+                <a:cs typeface="Courier" charset="0"/>
+              </a:rPr>
+              <a:t>#SBATCH </a:t>
+            </a:r>
+            <a:r>
+              <a:rPr lang="en-US" sz="1400" dirty="0" smtClean="0">
+                <a:latin typeface="Courier" charset="0"/>
+                <a:ea typeface="Courier" charset="0"/>
+                <a:cs typeface="Courier" charset="0"/>
+              </a:rPr>
+              <a:t>--reservation=parallelD1 </a:t>
+            </a:r>
+            <a:r>
+              <a:rPr lang="en-US" sz="1400" dirty="0">
+                <a:latin typeface="Courier" charset="0"/>
+                <a:ea typeface="Courier" charset="0"/>
+                <a:cs typeface="Courier" charset="0"/>
+              </a:rPr>
+              <a:t>    # Specify </a:t>
+            </a:r>
+            <a:r>
+              <a:rPr lang="en-US" sz="1400" dirty="0" smtClean="0">
+                <a:latin typeface="Courier" charset="0"/>
+                <a:ea typeface="Courier" charset="0"/>
+                <a:cs typeface="Courier" charset="0"/>
+              </a:rPr>
+              <a:t>reservation</a:t>
+            </a:r>
+            <a:endParaRPr lang="en-US" sz="1400" dirty="0">
+              <a:latin typeface="Courier" charset="0"/>
+              <a:ea typeface="Courier" charset="0"/>
+              <a:cs typeface="Courier" charset="0"/>
+            </a:endParaRPr>
+          </a:p>
+          <a:p>
+            <a:pPr marL="114300" indent="0">
+              <a:buNone/>
+            </a:pPr>
+            <a:r>
+              <a:rPr lang="en-US" sz="1400" dirty="0">
+                <a:latin typeface="Courier" charset="0"/>
+                <a:ea typeface="Courier" charset="0"/>
+                <a:cs typeface="Courier" charset="0"/>
+              </a:rPr>
+              <a:t>#SBATCH --partition=</a:t>
+            </a:r>
+            <a:r>
+              <a:rPr lang="en-US" sz="1400" dirty="0" err="1">
+                <a:latin typeface="Courier" charset="0"/>
+                <a:ea typeface="Courier" charset="0"/>
+                <a:cs typeface="Courier" charset="0"/>
+              </a:rPr>
+              <a:t>shas</a:t>
+            </a:r>
+            <a:r>
+              <a:rPr lang="en-US" sz="1400" dirty="0">
+                <a:latin typeface="Courier" charset="0"/>
+                <a:ea typeface="Courier" charset="0"/>
+                <a:cs typeface="Courier" charset="0"/>
+              </a:rPr>
+              <a:t>             # Specify Summit </a:t>
+            </a:r>
+            <a:r>
+              <a:rPr lang="en-US" sz="1400" dirty="0" err="1">
+                <a:latin typeface="Courier" charset="0"/>
+                <a:ea typeface="Courier" charset="0"/>
+                <a:cs typeface="Courier" charset="0"/>
+              </a:rPr>
+              <a:t>haswell</a:t>
+            </a:r>
+            <a:r>
+              <a:rPr lang="en-US" sz="1400" dirty="0">
+                <a:latin typeface="Courier" charset="0"/>
+                <a:ea typeface="Courier" charset="0"/>
+                <a:cs typeface="Courier" charset="0"/>
+              </a:rPr>
+              <a:t> nodes</a:t>
+            </a:r>
+          </a:p>
+          <a:p>
+            <a:pPr marL="114300" indent="0">
+              <a:buNone/>
+            </a:pPr>
+            <a:r>
+              <a:rPr lang="en-US" sz="1400" dirty="0" smtClean="0">
+                <a:latin typeface="Courier" charset="0"/>
+                <a:ea typeface="Courier" charset="0"/>
+                <a:cs typeface="Courier" charset="0"/>
+              </a:rPr>
+              <a:t>#</a:t>
+            </a:r>
+            <a:r>
+              <a:rPr lang="en-US" sz="1400" dirty="0">
+                <a:latin typeface="Courier" charset="0"/>
+                <a:ea typeface="Courier" charset="0"/>
+                <a:cs typeface="Courier" charset="0"/>
+              </a:rPr>
+              <a:t>SBATCH --</a:t>
+            </a:r>
+            <a:r>
+              <a:rPr lang="en-US" sz="1400" dirty="0" smtClean="0">
+                <a:latin typeface="Courier" charset="0"/>
+                <a:ea typeface="Courier" charset="0"/>
+                <a:cs typeface="Courier" charset="0"/>
+              </a:rPr>
+              <a:t>job-name=job1    </a:t>
+            </a:r>
+            <a:r>
+              <a:rPr lang="en-US" sz="1400" dirty="0">
+                <a:latin typeface="Courier" charset="0"/>
+                <a:ea typeface="Courier" charset="0"/>
+                <a:cs typeface="Courier" charset="0"/>
+              </a:rPr>
+              <a:t>          # Job </a:t>
+            </a:r>
+            <a:r>
+              <a:rPr lang="en-US" sz="1400" dirty="0" smtClean="0">
+                <a:latin typeface="Courier" charset="0"/>
+                <a:ea typeface="Courier" charset="0"/>
+                <a:cs typeface="Courier" charset="0"/>
+              </a:rPr>
+              <a:t>name</a:t>
+            </a:r>
+            <a:endParaRPr lang="en-US" sz="1400" dirty="0">
+              <a:latin typeface="Courier" charset="0"/>
+              <a:ea typeface="Courier" charset="0"/>
+              <a:cs typeface="Courier" charset="0"/>
+            </a:endParaRPr>
+          </a:p>
+          <a:p>
+            <a:pPr marL="114300" indent="0">
+              <a:buNone/>
+            </a:pPr>
+            <a:r>
+              <a:rPr lang="en-US" sz="1400" dirty="0">
+                <a:latin typeface="Courier" charset="0"/>
+                <a:ea typeface="Courier" charset="0"/>
+                <a:cs typeface="Courier" charset="0"/>
+              </a:rPr>
+              <a:t>#SBATCH --</a:t>
+            </a:r>
+            <a:r>
+              <a:rPr lang="en-US" sz="1400" dirty="0" smtClean="0">
+                <a:latin typeface="Courier" charset="0"/>
+                <a:ea typeface="Courier" charset="0"/>
+                <a:cs typeface="Courier" charset="0"/>
+              </a:rPr>
+              <a:t>output=job1.%j.out     </a:t>
+            </a:r>
+            <a:r>
+              <a:rPr lang="en-US" sz="1400" dirty="0">
+                <a:latin typeface="Courier" charset="0"/>
+                <a:ea typeface="Courier" charset="0"/>
+                <a:cs typeface="Courier" charset="0"/>
+              </a:rPr>
+              <a:t>    # Output file name with Job </a:t>
+            </a:r>
+            <a:r>
+              <a:rPr lang="en-US" sz="1400" dirty="0" smtClean="0">
+                <a:latin typeface="Courier" charset="0"/>
+                <a:ea typeface="Courier" charset="0"/>
+                <a:cs typeface="Courier" charset="0"/>
+              </a:rPr>
+              <a:t>ID</a:t>
+            </a:r>
+            <a:r>
+              <a:rPr lang="en-US" sz="1400" dirty="0">
+                <a:latin typeface="Courier" charset="0"/>
+                <a:ea typeface="Courier" charset="0"/>
+                <a:cs typeface="Courier" charset="0"/>
+              </a:rPr>
+              <a:t> </a:t>
+            </a:r>
+          </a:p>
+          <a:p>
+            <a:pPr marL="114300" indent="0">
+              <a:buNone/>
+            </a:pPr>
+            <a:endParaRPr lang="en-US" sz="1400" dirty="0" smtClean="0">
+              <a:latin typeface="Courier" charset="0"/>
+              <a:ea typeface="Courier" charset="0"/>
+              <a:cs typeface="Courier" charset="0"/>
+            </a:endParaRPr>
+          </a:p>
+          <a:p>
+            <a:pPr marL="114300" indent="0">
+              <a:buNone/>
+            </a:pPr>
+            <a:r>
+              <a:rPr lang="en-US" sz="1400" dirty="0" smtClean="0">
+                <a:latin typeface="Courier" charset="0"/>
+                <a:ea typeface="Courier" charset="0"/>
+                <a:cs typeface="Courier" charset="0"/>
+              </a:rPr>
+              <a:t>cd /home/$USER/</a:t>
+            </a:r>
+            <a:r>
+              <a:rPr lang="en-US" sz="1400" dirty="0" err="1" smtClean="0">
+                <a:latin typeface="Courier" charset="0"/>
+                <a:ea typeface="Courier" charset="0"/>
+                <a:cs typeface="Courier" charset="0"/>
+              </a:rPr>
+              <a:t>Parallelization_Workshop</a:t>
+            </a:r>
+            <a:r>
+              <a:rPr lang="en-US" sz="1400" dirty="0" smtClean="0">
+                <a:latin typeface="Courier" charset="0"/>
+                <a:ea typeface="Courier" charset="0"/>
+                <a:cs typeface="Courier" charset="0"/>
+              </a:rPr>
+              <a:t>/Day1/</a:t>
+            </a:r>
+            <a:r>
+              <a:rPr lang="en-US" sz="1400" dirty="0" err="1" smtClean="0">
+                <a:latin typeface="Courier" charset="0"/>
+                <a:ea typeface="Courier" charset="0"/>
+                <a:cs typeface="Courier" charset="0"/>
+              </a:rPr>
+              <a:t>Slurm</a:t>
+            </a:r>
+            <a:endParaRPr lang="en-US" sz="1400" dirty="0" smtClean="0">
+              <a:latin typeface="Courier" charset="0"/>
+              <a:ea typeface="Courier" charset="0"/>
+              <a:cs typeface="Courier" charset="0"/>
+            </a:endParaRPr>
+          </a:p>
+          <a:p>
+            <a:pPr marL="114300" indent="0">
+              <a:buNone/>
+            </a:pPr>
+            <a:r>
+              <a:rPr lang="en-US" sz="1400" dirty="0">
+                <a:latin typeface="Courier" charset="0"/>
+                <a:ea typeface="Courier" charset="0"/>
+                <a:cs typeface="Courier" charset="0"/>
+              </a:rPr>
+              <a:t>e</a:t>
+            </a:r>
+            <a:r>
+              <a:rPr lang="en-US" sz="1400" dirty="0" smtClean="0">
+                <a:latin typeface="Courier" charset="0"/>
+                <a:ea typeface="Courier" charset="0"/>
+                <a:cs typeface="Courier" charset="0"/>
+              </a:rPr>
+              <a:t>cho “job1 starting” `date`</a:t>
+            </a:r>
+          </a:p>
+          <a:p>
+            <a:pPr marL="114300" indent="0">
+              <a:buNone/>
+            </a:pPr>
+            <a:r>
+              <a:rPr lang="en-US" sz="1400" dirty="0">
+                <a:latin typeface="Courier" charset="0"/>
+                <a:ea typeface="Courier" charset="0"/>
+                <a:cs typeface="Courier" charset="0"/>
+              </a:rPr>
+              <a:t>s</a:t>
+            </a:r>
+            <a:r>
+              <a:rPr lang="en-US" sz="1400" dirty="0" smtClean="0">
+                <a:latin typeface="Courier" charset="0"/>
+                <a:ea typeface="Courier" charset="0"/>
+                <a:cs typeface="Courier" charset="0"/>
+              </a:rPr>
+              <a:t>leep 60</a:t>
+            </a:r>
+          </a:p>
+          <a:p>
+            <a:pPr marL="114300" indent="0">
+              <a:buNone/>
+            </a:pPr>
+            <a:r>
+              <a:rPr lang="en-US" sz="1400" dirty="0">
+                <a:latin typeface="Courier" charset="0"/>
+                <a:ea typeface="Courier" charset="0"/>
+                <a:cs typeface="Courier" charset="0"/>
+              </a:rPr>
+              <a:t>e</a:t>
+            </a:r>
+            <a:r>
+              <a:rPr lang="en-US" sz="1400" dirty="0" smtClean="0">
+                <a:latin typeface="Courier" charset="0"/>
+                <a:ea typeface="Courier" charset="0"/>
+                <a:cs typeface="Courier" charset="0"/>
+              </a:rPr>
+              <a:t>cho “job1 ending” `date`</a:t>
+            </a:r>
+          </a:p>
+          <a:p>
+            <a:endParaRPr lang="en-US" dirty="0"/>
+          </a:p>
+        </p:txBody>
+      </p:sp>
+      <p:sp>
+        <p:nvSpPr>
+          <p:cNvPr id="4" name="Date Placeholder 3"/>
+          <p:cNvSpPr>
+            <a:spLocks noGrp="1"/>
+          </p:cNvSpPr>
+          <p:nvPr>
+            <p:ph type="dt" sz="half" idx="10"/>
+          </p:nvPr>
+        </p:nvSpPr>
+        <p:spPr/>
+        <p:txBody>
+          <a:bodyPr/>
+          <a:lstStyle/>
+          <a:p>
+            <a:r>
+              <a:rPr lang="en-US" smtClean="0"/>
+              <a:t>5/15/17</a:t>
+            </a:r>
+            <a:endParaRPr lang="en-US"/>
+          </a:p>
+        </p:txBody>
+      </p:sp>
+      <p:sp>
+        <p:nvSpPr>
+          <p:cNvPr id="5" name="Footer Placeholder 4"/>
+          <p:cNvSpPr>
+            <a:spLocks noGrp="1"/>
+          </p:cNvSpPr>
+          <p:nvPr>
+            <p:ph type="ftr" sz="quarter" idx="11"/>
+          </p:nvPr>
+        </p:nvSpPr>
+        <p:spPr/>
+        <p:txBody>
+          <a:bodyPr/>
+          <a:lstStyle/>
+          <a:p>
+            <a:r>
+              <a:rPr lang="en-US" smtClean="0"/>
+              <a:t>Parallel workshop</a:t>
+            </a:r>
+            <a:endParaRPr lang="en-US"/>
+          </a:p>
+        </p:txBody>
+      </p:sp>
+      <p:sp>
+        <p:nvSpPr>
+          <p:cNvPr id="6" name="Slide Number Placeholder 5"/>
+          <p:cNvSpPr>
+            <a:spLocks noGrp="1"/>
+          </p:cNvSpPr>
+          <p:nvPr>
+            <p:ph type="sldNum" sz="quarter" idx="4"/>
+          </p:nvPr>
+        </p:nvSpPr>
+        <p:spPr/>
+        <p:txBody>
+          <a:bodyPr/>
+          <a:lstStyle/>
+          <a:p>
+            <a:fld id="{F81D5560-9D92-7847-90AE-DC1482349ABE}" type="slidenum">
+              <a:rPr lang="en-US" smtClean="0"/>
+              <a:t>27</a:t>
+            </a:fld>
+            <a:endParaRPr lang="en-US"/>
+          </a:p>
+        </p:txBody>
+      </p:sp>
+    </p:spTree>
+    <p:extLst>
+      <p:ext uri="{BB962C8B-B14F-4D97-AF65-F5344CB8AC3E}">
+        <p14:creationId xmlns:p14="http://schemas.microsoft.com/office/powerpoint/2010/main" val="1966273547"/>
+      </p:ext>
+    </p:extLst>
+  </p:cSld>
+  <p:clrMapOvr>
+    <a:masterClrMapping/>
+  </p:clrMapOvr>
+  <p:timing>
+    <p:tnLst>
+      <p:par>
+        <p:cTn id="1" dur="indefinite" restart="never" nodeType="tmRoot"/>
+      </p:par>
+    </p:tnLst>
+  </p:timing>
+</p:sld>
+</file>
+
+<file path=ppt/slides/slide28.xml><?xml version="1.0" encoding="utf-8"?>
+<p:sld xmlns:a="http://schemas.openxmlformats.org/drawingml/2006/main" xmlns:r="http://schemas.openxmlformats.org/officeDocument/2006/relationships" xmlns:p="http://schemas.openxmlformats.org/presentationml/2006/main">
+  <p:cSld>
+    <p:spTree>
+      <p:nvGrpSpPr>
+        <p:cNvPr id="1" name=""/>
+        <p:cNvGrpSpPr/>
+        <p:nvPr/>
+      </p:nvGrpSpPr>
+      <p:grpSpPr>
+        <a:xfrm>
+          <a:off x="0" y="0"/>
+          <a:ext cx="0" cy="0"/>
+          <a:chOff x="0" y="0"/>
+          <a:chExt cx="0" cy="0"/>
+        </a:xfrm>
+      </p:grpSpPr>
+      <p:sp>
+        <p:nvSpPr>
+          <p:cNvPr id="2" name="Title 1"/>
+          <p:cNvSpPr>
+            <a:spLocks noGrp="1"/>
+          </p:cNvSpPr>
+          <p:nvPr>
+            <p:ph type="title"/>
+          </p:nvPr>
+        </p:nvSpPr>
+        <p:spPr/>
+        <p:txBody>
+          <a:bodyPr/>
+          <a:lstStyle/>
+          <a:p>
+            <a:r>
+              <a:rPr lang="en-US" dirty="0" smtClean="0">
+                <a:solidFill>
+                  <a:schemeClr val="tx2"/>
+                </a:solidFill>
+              </a:rPr>
+              <a:t>Thank you!</a:t>
+            </a:r>
+            <a:endParaRPr lang="en-US" dirty="0">
+              <a:solidFill>
+                <a:schemeClr val="tx2"/>
+              </a:solidFill>
+            </a:endParaRPr>
+          </a:p>
+        </p:txBody>
+      </p:sp>
+      <p:sp>
+        <p:nvSpPr>
+          <p:cNvPr id="3" name="Content Placeholder 2"/>
+          <p:cNvSpPr>
+            <a:spLocks noGrp="1"/>
+          </p:cNvSpPr>
+          <p:nvPr>
+            <p:ph idx="1"/>
+          </p:nvPr>
+        </p:nvSpPr>
+        <p:spPr/>
+        <p:txBody>
           <a:bodyPr/>
           <a:lstStyle/>
           <a:p>
@@ -21607,7 +25154,7 @@
             <a:fld id="{249E94F7-107C-CE46-8C56-9CACFF99CD93}" type="slidenum">
               <a:rPr lang="en-US" smtClean="0"/>
               <a:pPr/>
-              <a:t>23</a:t>
+              <a:t>28</a:t>
             </a:fld>
             <a:endParaRPr lang="en-US" dirty="0"/>
           </a:p>

</xml_diff>